<commit_message>
conclusão da prova, onde foi adicionado animações, transições e alguns elementos nos slides.
</commit_message>
<xml_diff>
--- a/prova.pptx
+++ b/prova.pptx
@@ -10,7 +10,8 @@
     <p:sldId id="258" r:id="rId4"/>
     <p:sldId id="259" r:id="rId5"/>
     <p:sldId id="260" r:id="rId6"/>
-    <p:sldId id="261" r:id="rId7"/>
+    <p:sldId id="262" r:id="rId7"/>
+    <p:sldId id="261" r:id="rId8"/>
   </p:sldIdLst>
   <p:sldSz cx="12192000" cy="6858000"/>
   <p:notesSz cx="6858000" cy="9144000"/>
@@ -109,6 +110,11 @@
       </a:defRPr>
     </a:lvl9pPr>
   </p:defaultTextStyle>
+  <p:extLst>
+    <p:ext uri="{EFAFB233-063F-42B5-8137-9DF3F51BA10A}">
+      <p15:sldGuideLst xmlns:p15="http://schemas.microsoft.com/office/powerpoint/2012/main"/>
+    </p:ext>
+  </p:extLst>
 </p:presentation>
 </file>
 
@@ -259,7 +265,7 @@
           <a:p>
             <a:fld id="{66BFDCAC-862E-4DFB-8DD8-3697B79551C2}" type="datetimeFigureOut">
               <a:rPr lang="pt-BR" smtClean="0"/>
-              <a:t>08/03/2025</a:t>
+              <a:t>15/03/2025</a:t>
             </a:fld>
             <a:endParaRPr lang="pt-BR"/>
           </a:p>
@@ -457,7 +463,7 @@
           <a:p>
             <a:fld id="{66BFDCAC-862E-4DFB-8DD8-3697B79551C2}" type="datetimeFigureOut">
               <a:rPr lang="pt-BR" smtClean="0"/>
-              <a:t>08/03/2025</a:t>
+              <a:t>15/03/2025</a:t>
             </a:fld>
             <a:endParaRPr lang="pt-BR"/>
           </a:p>
@@ -665,7 +671,7 @@
           <a:p>
             <a:fld id="{66BFDCAC-862E-4DFB-8DD8-3697B79551C2}" type="datetimeFigureOut">
               <a:rPr lang="pt-BR" smtClean="0"/>
-              <a:t>08/03/2025</a:t>
+              <a:t>15/03/2025</a:t>
             </a:fld>
             <a:endParaRPr lang="pt-BR"/>
           </a:p>
@@ -863,7 +869,7 @@
           <a:p>
             <a:fld id="{66BFDCAC-862E-4DFB-8DD8-3697B79551C2}" type="datetimeFigureOut">
               <a:rPr lang="pt-BR" smtClean="0"/>
-              <a:t>08/03/2025</a:t>
+              <a:t>15/03/2025</a:t>
             </a:fld>
             <a:endParaRPr lang="pt-BR"/>
           </a:p>
@@ -1138,7 +1144,7 @@
           <a:p>
             <a:fld id="{66BFDCAC-862E-4DFB-8DD8-3697B79551C2}" type="datetimeFigureOut">
               <a:rPr lang="pt-BR" smtClean="0"/>
-              <a:t>08/03/2025</a:t>
+              <a:t>15/03/2025</a:t>
             </a:fld>
             <a:endParaRPr lang="pt-BR"/>
           </a:p>
@@ -1403,7 +1409,7 @@
           <a:p>
             <a:fld id="{66BFDCAC-862E-4DFB-8DD8-3697B79551C2}" type="datetimeFigureOut">
               <a:rPr lang="pt-BR" smtClean="0"/>
-              <a:t>08/03/2025</a:t>
+              <a:t>15/03/2025</a:t>
             </a:fld>
             <a:endParaRPr lang="pt-BR"/>
           </a:p>
@@ -1815,7 +1821,7 @@
           <a:p>
             <a:fld id="{66BFDCAC-862E-4DFB-8DD8-3697B79551C2}" type="datetimeFigureOut">
               <a:rPr lang="pt-BR" smtClean="0"/>
-              <a:t>08/03/2025</a:t>
+              <a:t>15/03/2025</a:t>
             </a:fld>
             <a:endParaRPr lang="pt-BR"/>
           </a:p>
@@ -1956,7 +1962,7 @@
           <a:p>
             <a:fld id="{66BFDCAC-862E-4DFB-8DD8-3697B79551C2}" type="datetimeFigureOut">
               <a:rPr lang="pt-BR" smtClean="0"/>
-              <a:t>08/03/2025</a:t>
+              <a:t>15/03/2025</a:t>
             </a:fld>
             <a:endParaRPr lang="pt-BR"/>
           </a:p>
@@ -2069,7 +2075,7 @@
           <a:p>
             <a:fld id="{66BFDCAC-862E-4DFB-8DD8-3697B79551C2}" type="datetimeFigureOut">
               <a:rPr lang="pt-BR" smtClean="0"/>
-              <a:t>08/03/2025</a:t>
+              <a:t>15/03/2025</a:t>
             </a:fld>
             <a:endParaRPr lang="pt-BR"/>
           </a:p>
@@ -2380,7 +2386,7 @@
           <a:p>
             <a:fld id="{66BFDCAC-862E-4DFB-8DD8-3697B79551C2}" type="datetimeFigureOut">
               <a:rPr lang="pt-BR" smtClean="0"/>
-              <a:t>08/03/2025</a:t>
+              <a:t>15/03/2025</a:t>
             </a:fld>
             <a:endParaRPr lang="pt-BR"/>
           </a:p>
@@ -2668,7 +2674,7 @@
           <a:p>
             <a:fld id="{66BFDCAC-862E-4DFB-8DD8-3697B79551C2}" type="datetimeFigureOut">
               <a:rPr lang="pt-BR" smtClean="0"/>
-              <a:t>08/03/2025</a:t>
+              <a:t>15/03/2025</a:t>
             </a:fld>
             <a:endParaRPr lang="pt-BR"/>
           </a:p>
@@ -2909,7 +2915,7 @@
           <a:p>
             <a:fld id="{66BFDCAC-862E-4DFB-8DD8-3697B79551C2}" type="datetimeFigureOut">
               <a:rPr lang="pt-BR" smtClean="0"/>
-              <a:t>08/03/2025</a:t>
+              <a:t>15/03/2025</a:t>
             </a:fld>
             <a:endParaRPr lang="pt-BR"/>
           </a:p>
@@ -3718,6 +3724,9 @@
   <p:clrMapOvr>
     <a:masterClrMapping/>
   </p:clrMapOvr>
+  <p:transition spd="slow">
+    <p:wipe/>
+  </p:transition>
   <p:timing>
     <p:tnLst>
       <p:par>
@@ -3730,6 +3739,9 @@
                     <p:cTn id="3" fill="hold">
                       <p:stCondLst>
                         <p:cond delay="indefinite"/>
+                        <p:cond evt="onBegin" delay="0">
+                          <p:tn val="2"/>
+                        </p:cond>
                       </p:stCondLst>
                       <p:childTnLst>
                         <p:par>
@@ -3739,7 +3751,7 @@
                             </p:stCondLst>
                             <p:childTnLst>
                               <p:par>
-                                <p:cTn id="5" presetID="10" presetClass="entr" presetSubtype="0" fill="hold" grpId="0" nodeType="clickEffect">
+                                <p:cTn id="5" presetID="6" presetClass="entr" presetSubtype="16" fill="hold" grpId="0" nodeType="withEffect">
                                   <p:stCondLst>
                                     <p:cond delay="0"/>
                                   </p:stCondLst>
@@ -3747,6 +3759,94 @@
                                     <p:set>
                                       <p:cBhvr>
                                         <p:cTn id="6" dur="1" fill="hold">
+                                          <p:stCondLst>
+                                            <p:cond delay="0"/>
+                                          </p:stCondLst>
+                                        </p:cTn>
+                                        <p:tgtEl>
+                                          <p:spTgt spid="10"/>
+                                        </p:tgtEl>
+                                        <p:attrNameLst>
+                                          <p:attrName>style.visibility</p:attrName>
+                                        </p:attrNameLst>
+                                      </p:cBhvr>
+                                      <p:to>
+                                        <p:strVal val="visible"/>
+                                      </p:to>
+                                    </p:set>
+                                    <p:animEffect transition="in" filter="circle(in)">
+                                      <p:cBhvr>
+                                        <p:cTn id="7" dur="1300"/>
+                                        <p:tgtEl>
+                                          <p:spTgt spid="10"/>
+                                        </p:tgtEl>
+                                      </p:cBhvr>
+                                    </p:animEffect>
+                                  </p:childTnLst>
+                                </p:cTn>
+                              </p:par>
+                              <p:par>
+                                <p:cTn id="8" presetID="10" presetClass="entr" presetSubtype="0" fill="hold" nodeType="withEffect">
+                                  <p:stCondLst>
+                                    <p:cond delay="0"/>
+                                  </p:stCondLst>
+                                  <p:childTnLst>
+                                    <p:set>
+                                      <p:cBhvr>
+                                        <p:cTn id="9" dur="1" fill="hold">
+                                          <p:stCondLst>
+                                            <p:cond delay="0"/>
+                                          </p:stCondLst>
+                                        </p:cTn>
+                                        <p:tgtEl>
+                                          <p:spTgt spid="8"/>
+                                        </p:tgtEl>
+                                        <p:attrNameLst>
+                                          <p:attrName>style.visibility</p:attrName>
+                                        </p:attrNameLst>
+                                      </p:cBhvr>
+                                      <p:to>
+                                        <p:strVal val="visible"/>
+                                      </p:to>
+                                    </p:set>
+                                    <p:animEffect transition="in" filter="fade">
+                                      <p:cBhvr>
+                                        <p:cTn id="10" dur="1400"/>
+                                        <p:tgtEl>
+                                          <p:spTgt spid="8"/>
+                                        </p:tgtEl>
+                                      </p:cBhvr>
+                                    </p:animEffect>
+                                  </p:childTnLst>
+                                </p:cTn>
+                              </p:par>
+                            </p:childTnLst>
+                          </p:cTn>
+                        </p:par>
+                      </p:childTnLst>
+                    </p:cTn>
+                  </p:par>
+                  <p:par>
+                    <p:cTn id="11" fill="hold">
+                      <p:stCondLst>
+                        <p:cond delay="indefinite"/>
+                      </p:stCondLst>
+                      <p:childTnLst>
+                        <p:par>
+                          <p:cTn id="12" fill="hold">
+                            <p:stCondLst>
+                              <p:cond delay="0"/>
+                            </p:stCondLst>
+                            <p:childTnLst>
+                              <p:par>
+                                <p:cTn id="13" presetID="2" presetClass="entr" presetSubtype="4" fill="hold" grpId="0" nodeType="clickEffect">
+                                  <p:stCondLst>
+                                    <p:cond delay="0"/>
+                                  </p:stCondLst>
+                                  <p:childTnLst>
+                                    <p:set>
+                                      <p:cBhvr>
+                                        <p:cTn id="14" dur="1" fill="hold">
                                           <p:stCondLst>
                                             <p:cond delay="0"/>
                                           </p:stCondLst>
@@ -3762,14 +3862,52 @@
                                         <p:strVal val="visible"/>
                                       </p:to>
                                     </p:set>
-                                    <p:animEffect transition="in" filter="fade">
-                                      <p:cBhvr>
-                                        <p:cTn id="7" dur="500"/>
+                                    <p:anim calcmode="lin" valueType="num">
+                                      <p:cBhvr additive="base">
+                                        <p:cTn id="15" dur="1500" fill="hold"/>
                                         <p:tgtEl>
                                           <p:spTgt spid="13"/>
                                         </p:tgtEl>
+                                        <p:attrNameLst>
+                                          <p:attrName>ppt_x</p:attrName>
+                                        </p:attrNameLst>
                                       </p:cBhvr>
-                                    </p:animEffect>
+                                      <p:tavLst>
+                                        <p:tav tm="0">
+                                          <p:val>
+                                            <p:strVal val="#ppt_x"/>
+                                          </p:val>
+                                        </p:tav>
+                                        <p:tav tm="100000">
+                                          <p:val>
+                                            <p:strVal val="#ppt_x"/>
+                                          </p:val>
+                                        </p:tav>
+                                      </p:tavLst>
+                                    </p:anim>
+                                    <p:anim calcmode="lin" valueType="num">
+                                      <p:cBhvr additive="base">
+                                        <p:cTn id="16" dur="1500" fill="hold"/>
+                                        <p:tgtEl>
+                                          <p:spTgt spid="13"/>
+                                        </p:tgtEl>
+                                        <p:attrNameLst>
+                                          <p:attrName>ppt_y</p:attrName>
+                                        </p:attrNameLst>
+                                      </p:cBhvr>
+                                      <p:tavLst>
+                                        <p:tav tm="0">
+                                          <p:val>
+                                            <p:strVal val="1+#ppt_h/2"/>
+                                          </p:val>
+                                        </p:tav>
+                                        <p:tav tm="100000">
+                                          <p:val>
+                                            <p:strVal val="#ppt_y"/>
+                                          </p:val>
+                                        </p:tav>
+                                      </p:tavLst>
+                                    </p:anim>
                                   </p:childTnLst>
                                 </p:cTn>
                               </p:par>
@@ -3801,6 +3939,7 @@
       </p:par>
     </p:tnLst>
     <p:bldLst>
+      <p:bldP spid="10" grpId="0" animBg="1"/>
       <p:bldP spid="13" grpId="0"/>
     </p:bldLst>
   </p:timing>
@@ -4755,6 +4894,169 @@
   <p:clrMapOvr>
     <a:masterClrMapping/>
   </p:clrMapOvr>
+  <p:transition spd="slow">
+    <p:wipe/>
+  </p:transition>
+  <p:timing>
+    <p:tnLst>
+      <p:par>
+        <p:cTn id="1" dur="indefinite" restart="never" nodeType="tmRoot">
+          <p:childTnLst>
+            <p:seq concurrent="1" nextAc="seek">
+              <p:cTn id="2" dur="indefinite" nodeType="mainSeq">
+                <p:childTnLst>
+                  <p:par>
+                    <p:cTn id="3" fill="hold">
+                      <p:stCondLst>
+                        <p:cond delay="indefinite"/>
+                      </p:stCondLst>
+                      <p:childTnLst>
+                        <p:par>
+                          <p:cTn id="4" fill="hold">
+                            <p:stCondLst>
+                              <p:cond delay="0"/>
+                            </p:stCondLst>
+                            <p:childTnLst>
+                              <p:par>
+                                <p:cTn id="5" presetID="2" presetClass="entr" presetSubtype="4" fill="hold" grpId="0" nodeType="clickEffect">
+                                  <p:stCondLst>
+                                    <p:cond delay="0"/>
+                                  </p:stCondLst>
+                                  <p:childTnLst>
+                                    <p:set>
+                                      <p:cBhvr>
+                                        <p:cTn id="6" dur="1" fill="hold">
+                                          <p:stCondLst>
+                                            <p:cond delay="0"/>
+                                          </p:stCondLst>
+                                        </p:cTn>
+                                        <p:tgtEl>
+                                          <p:spTgt spid="5"/>
+                                        </p:tgtEl>
+                                        <p:attrNameLst>
+                                          <p:attrName>style.visibility</p:attrName>
+                                        </p:attrNameLst>
+                                      </p:cBhvr>
+                                      <p:to>
+                                        <p:strVal val="visible"/>
+                                      </p:to>
+                                    </p:set>
+                                    <p:anim calcmode="lin" valueType="num">
+                                      <p:cBhvr additive="base">
+                                        <p:cTn id="7" dur="1400" fill="hold"/>
+                                        <p:tgtEl>
+                                          <p:spTgt spid="5"/>
+                                        </p:tgtEl>
+                                        <p:attrNameLst>
+                                          <p:attrName>ppt_x</p:attrName>
+                                        </p:attrNameLst>
+                                      </p:cBhvr>
+                                      <p:tavLst>
+                                        <p:tav tm="0">
+                                          <p:val>
+                                            <p:strVal val="#ppt_x"/>
+                                          </p:val>
+                                        </p:tav>
+                                        <p:tav tm="100000">
+                                          <p:val>
+                                            <p:strVal val="#ppt_x"/>
+                                          </p:val>
+                                        </p:tav>
+                                      </p:tavLst>
+                                    </p:anim>
+                                    <p:anim calcmode="lin" valueType="num">
+                                      <p:cBhvr additive="base">
+                                        <p:cTn id="8" dur="1400" fill="hold"/>
+                                        <p:tgtEl>
+                                          <p:spTgt spid="5"/>
+                                        </p:tgtEl>
+                                        <p:attrNameLst>
+                                          <p:attrName>ppt_y</p:attrName>
+                                        </p:attrNameLst>
+                                      </p:cBhvr>
+                                      <p:tavLst>
+                                        <p:tav tm="0">
+                                          <p:val>
+                                            <p:strVal val="1+#ppt_h/2"/>
+                                          </p:val>
+                                        </p:tav>
+                                        <p:tav tm="100000">
+                                          <p:val>
+                                            <p:strVal val="#ppt_y"/>
+                                          </p:val>
+                                        </p:tav>
+                                      </p:tavLst>
+                                    </p:anim>
+                                  </p:childTnLst>
+                                </p:cTn>
+                              </p:par>
+                              <p:par>
+                                <p:cTn id="9" presetID="22" presetClass="entr" presetSubtype="4" fill="hold" grpId="0" nodeType="withEffect">
+                                  <p:stCondLst>
+                                    <p:cond delay="900"/>
+                                  </p:stCondLst>
+                                  <p:childTnLst>
+                                    <p:set>
+                                      <p:cBhvr>
+                                        <p:cTn id="10" dur="1" fill="hold">
+                                          <p:stCondLst>
+                                            <p:cond delay="0"/>
+                                          </p:stCondLst>
+                                        </p:cTn>
+                                        <p:tgtEl>
+                                          <p:spTgt spid="6"/>
+                                        </p:tgtEl>
+                                        <p:attrNameLst>
+                                          <p:attrName>style.visibility</p:attrName>
+                                        </p:attrNameLst>
+                                      </p:cBhvr>
+                                      <p:to>
+                                        <p:strVal val="visible"/>
+                                      </p:to>
+                                    </p:set>
+                                    <p:animEffect transition="in" filter="wipe(down)">
+                                      <p:cBhvr>
+                                        <p:cTn id="11" dur="2100"/>
+                                        <p:tgtEl>
+                                          <p:spTgt spid="6"/>
+                                        </p:tgtEl>
+                                      </p:cBhvr>
+                                    </p:animEffect>
+                                  </p:childTnLst>
+                                </p:cTn>
+                              </p:par>
+                            </p:childTnLst>
+                          </p:cTn>
+                        </p:par>
+                      </p:childTnLst>
+                    </p:cTn>
+                  </p:par>
+                </p:childTnLst>
+              </p:cTn>
+              <p:prevCondLst>
+                <p:cond evt="onPrev" delay="0">
+                  <p:tgtEl>
+                    <p:sldTgt/>
+                  </p:tgtEl>
+                </p:cond>
+              </p:prevCondLst>
+              <p:nextCondLst>
+                <p:cond evt="onNext" delay="0">
+                  <p:tgtEl>
+                    <p:sldTgt/>
+                  </p:tgtEl>
+                </p:cond>
+              </p:nextCondLst>
+            </p:seq>
+          </p:childTnLst>
+        </p:cTn>
+      </p:par>
+    </p:tnLst>
+    <p:bldLst>
+      <p:bldP spid="5" grpId="0" animBg="1"/>
+      <p:bldP spid="6" grpId="0"/>
+    </p:bldLst>
+  </p:timing>
 </p:sld>
 </file>
 
@@ -5130,6 +5432,304 @@
   <p:clrMapOvr>
     <a:masterClrMapping/>
   </p:clrMapOvr>
+  <p:transition spd="slow">
+    <p:wipe/>
+  </p:transition>
+  <p:timing>
+    <p:tnLst>
+      <p:par>
+        <p:cTn id="1" dur="indefinite" restart="never" nodeType="tmRoot">
+          <p:childTnLst>
+            <p:seq concurrent="1" nextAc="seek">
+              <p:cTn id="2" dur="indefinite" nodeType="mainSeq">
+                <p:childTnLst>
+                  <p:par>
+                    <p:cTn id="3" fill="hold">
+                      <p:stCondLst>
+                        <p:cond delay="indefinite"/>
+                      </p:stCondLst>
+                      <p:childTnLst>
+                        <p:par>
+                          <p:cTn id="4" fill="hold">
+                            <p:stCondLst>
+                              <p:cond delay="0"/>
+                            </p:stCondLst>
+                            <p:childTnLst>
+                              <p:par>
+                                <p:cTn id="5" presetID="2" presetClass="entr" presetSubtype="4" fill="hold" grpId="0" nodeType="clickEffect">
+                                  <p:stCondLst>
+                                    <p:cond delay="0"/>
+                                  </p:stCondLst>
+                                  <p:childTnLst>
+                                    <p:set>
+                                      <p:cBhvr>
+                                        <p:cTn id="6" dur="1" fill="hold">
+                                          <p:stCondLst>
+                                            <p:cond delay="0"/>
+                                          </p:stCondLst>
+                                        </p:cTn>
+                                        <p:tgtEl>
+                                          <p:spTgt spid="4"/>
+                                        </p:tgtEl>
+                                        <p:attrNameLst>
+                                          <p:attrName>style.visibility</p:attrName>
+                                        </p:attrNameLst>
+                                      </p:cBhvr>
+                                      <p:to>
+                                        <p:strVal val="visible"/>
+                                      </p:to>
+                                    </p:set>
+                                    <p:anim calcmode="lin" valueType="num">
+                                      <p:cBhvr additive="base">
+                                        <p:cTn id="7" dur="1200" fill="hold"/>
+                                        <p:tgtEl>
+                                          <p:spTgt spid="4"/>
+                                        </p:tgtEl>
+                                        <p:attrNameLst>
+                                          <p:attrName>ppt_x</p:attrName>
+                                        </p:attrNameLst>
+                                      </p:cBhvr>
+                                      <p:tavLst>
+                                        <p:tav tm="0">
+                                          <p:val>
+                                            <p:strVal val="#ppt_x"/>
+                                          </p:val>
+                                        </p:tav>
+                                        <p:tav tm="100000">
+                                          <p:val>
+                                            <p:strVal val="#ppt_x"/>
+                                          </p:val>
+                                        </p:tav>
+                                      </p:tavLst>
+                                    </p:anim>
+                                    <p:anim calcmode="lin" valueType="num">
+                                      <p:cBhvr additive="base">
+                                        <p:cTn id="8" dur="1200" fill="hold"/>
+                                        <p:tgtEl>
+                                          <p:spTgt spid="4"/>
+                                        </p:tgtEl>
+                                        <p:attrNameLst>
+                                          <p:attrName>ppt_y</p:attrName>
+                                        </p:attrNameLst>
+                                      </p:cBhvr>
+                                      <p:tavLst>
+                                        <p:tav tm="0">
+                                          <p:val>
+                                            <p:strVal val="1+#ppt_h/2"/>
+                                          </p:val>
+                                        </p:tav>
+                                        <p:tav tm="100000">
+                                          <p:val>
+                                            <p:strVal val="#ppt_y"/>
+                                          </p:val>
+                                        </p:tav>
+                                      </p:tavLst>
+                                    </p:anim>
+                                  </p:childTnLst>
+                                </p:cTn>
+                              </p:par>
+                            </p:childTnLst>
+                          </p:cTn>
+                        </p:par>
+                      </p:childTnLst>
+                    </p:cTn>
+                  </p:par>
+                  <p:par>
+                    <p:cTn id="9" fill="hold">
+                      <p:stCondLst>
+                        <p:cond delay="indefinite"/>
+                      </p:stCondLst>
+                      <p:childTnLst>
+                        <p:par>
+                          <p:cTn id="10" fill="hold">
+                            <p:stCondLst>
+                              <p:cond delay="0"/>
+                            </p:stCondLst>
+                            <p:childTnLst>
+                              <p:par>
+                                <p:cTn id="11" presetID="10" presetClass="entr" presetSubtype="0" fill="hold" grpId="0" nodeType="clickEffect">
+                                  <p:stCondLst>
+                                    <p:cond delay="700"/>
+                                  </p:stCondLst>
+                                  <p:childTnLst>
+                                    <p:set>
+                                      <p:cBhvr>
+                                        <p:cTn id="12" dur="1" fill="hold">
+                                          <p:stCondLst>
+                                            <p:cond delay="0"/>
+                                          </p:stCondLst>
+                                        </p:cTn>
+                                        <p:tgtEl>
+                                          <p:spTgt spid="5"/>
+                                        </p:tgtEl>
+                                        <p:attrNameLst>
+                                          <p:attrName>style.visibility</p:attrName>
+                                        </p:attrNameLst>
+                                      </p:cBhvr>
+                                      <p:to>
+                                        <p:strVal val="visible"/>
+                                      </p:to>
+                                    </p:set>
+                                    <p:animEffect transition="in" filter="fade">
+                                      <p:cBhvr>
+                                        <p:cTn id="13" dur="1200"/>
+                                        <p:tgtEl>
+                                          <p:spTgt spid="5"/>
+                                        </p:tgtEl>
+                                      </p:cBhvr>
+                                    </p:animEffect>
+                                  </p:childTnLst>
+                                </p:cTn>
+                              </p:par>
+                              <p:par>
+                                <p:cTn id="14" presetID="42" presetClass="entr" presetSubtype="0" fill="hold" nodeType="withEffect">
+                                  <p:stCondLst>
+                                    <p:cond delay="700"/>
+                                  </p:stCondLst>
+                                  <p:childTnLst>
+                                    <p:set>
+                                      <p:cBhvr>
+                                        <p:cTn id="15" dur="1" fill="hold">
+                                          <p:stCondLst>
+                                            <p:cond delay="0"/>
+                                          </p:stCondLst>
+                                        </p:cTn>
+                                        <p:tgtEl>
+                                          <p:spTgt spid="3"/>
+                                        </p:tgtEl>
+                                        <p:attrNameLst>
+                                          <p:attrName>style.visibility</p:attrName>
+                                        </p:attrNameLst>
+                                      </p:cBhvr>
+                                      <p:to>
+                                        <p:strVal val="visible"/>
+                                      </p:to>
+                                    </p:set>
+                                    <p:animEffect transition="in" filter="fade">
+                                      <p:cBhvr>
+                                        <p:cTn id="16" dur="1000"/>
+                                        <p:tgtEl>
+                                          <p:spTgt spid="3"/>
+                                        </p:tgtEl>
+                                      </p:cBhvr>
+                                    </p:animEffect>
+                                    <p:anim calcmode="lin" valueType="num">
+                                      <p:cBhvr>
+                                        <p:cTn id="17" dur="1000" fill="hold"/>
+                                        <p:tgtEl>
+                                          <p:spTgt spid="3"/>
+                                        </p:tgtEl>
+                                        <p:attrNameLst>
+                                          <p:attrName>ppt_x</p:attrName>
+                                        </p:attrNameLst>
+                                      </p:cBhvr>
+                                      <p:tavLst>
+                                        <p:tav tm="0">
+                                          <p:val>
+                                            <p:strVal val="#ppt_x"/>
+                                          </p:val>
+                                        </p:tav>
+                                        <p:tav tm="100000">
+                                          <p:val>
+                                            <p:strVal val="#ppt_x"/>
+                                          </p:val>
+                                        </p:tav>
+                                      </p:tavLst>
+                                    </p:anim>
+                                    <p:anim calcmode="lin" valueType="num">
+                                      <p:cBhvr>
+                                        <p:cTn id="18" dur="1000" fill="hold"/>
+                                        <p:tgtEl>
+                                          <p:spTgt spid="3"/>
+                                        </p:tgtEl>
+                                        <p:attrNameLst>
+                                          <p:attrName>ppt_y</p:attrName>
+                                        </p:attrNameLst>
+                                      </p:cBhvr>
+                                      <p:tavLst>
+                                        <p:tav tm="0">
+                                          <p:val>
+                                            <p:strVal val="#ppt_y+.1"/>
+                                          </p:val>
+                                        </p:tav>
+                                        <p:tav tm="100000">
+                                          <p:val>
+                                            <p:strVal val="#ppt_y"/>
+                                          </p:val>
+                                        </p:tav>
+                                      </p:tavLst>
+                                    </p:anim>
+                                  </p:childTnLst>
+                                </p:cTn>
+                              </p:par>
+                              <p:par>
+                                <p:cTn id="19" presetID="22" presetClass="entr" presetSubtype="4" fill="hold" grpId="0" nodeType="withEffect">
+                                  <p:stCondLst>
+                                    <p:cond delay="700"/>
+                                  </p:stCondLst>
+                                  <p:childTnLst>
+                                    <p:set>
+                                      <p:cBhvr>
+                                        <p:cTn id="20" dur="1" fill="hold">
+                                          <p:stCondLst>
+                                            <p:cond delay="0"/>
+                                          </p:stCondLst>
+                                        </p:cTn>
+                                        <p:tgtEl>
+                                          <p:spTgt spid="6"/>
+                                        </p:tgtEl>
+                                        <p:attrNameLst>
+                                          <p:attrName>style.visibility</p:attrName>
+                                        </p:attrNameLst>
+                                      </p:cBhvr>
+                                      <p:to>
+                                        <p:strVal val="visible"/>
+                                      </p:to>
+                                    </p:set>
+                                    <p:animEffect transition="in" filter="wipe(down)">
+                                      <p:cBhvr>
+                                        <p:cTn id="21" dur="1500"/>
+                                        <p:tgtEl>
+                                          <p:spTgt spid="6"/>
+                                        </p:tgtEl>
+                                      </p:cBhvr>
+                                    </p:animEffect>
+                                  </p:childTnLst>
+                                </p:cTn>
+                              </p:par>
+                            </p:childTnLst>
+                          </p:cTn>
+                        </p:par>
+                      </p:childTnLst>
+                    </p:cTn>
+                  </p:par>
+                </p:childTnLst>
+              </p:cTn>
+              <p:prevCondLst>
+                <p:cond evt="onPrev" delay="0">
+                  <p:tgtEl>
+                    <p:sldTgt/>
+                  </p:tgtEl>
+                </p:cond>
+              </p:prevCondLst>
+              <p:nextCondLst>
+                <p:cond evt="onNext" delay="0">
+                  <p:tgtEl>
+                    <p:sldTgt/>
+                  </p:tgtEl>
+                </p:cond>
+              </p:nextCondLst>
+            </p:seq>
+          </p:childTnLst>
+        </p:cTn>
+      </p:par>
+    </p:tnLst>
+    <p:bldLst>
+      <p:bldP spid="4" grpId="0" animBg="1"/>
+      <p:bldP spid="5" grpId="0"/>
+      <p:bldP spid="6" grpId="0"/>
+    </p:bldLst>
+  </p:timing>
 </p:sld>
 </file>
 
@@ -5413,6 +6013,304 @@
   <p:clrMapOvr>
     <a:masterClrMapping/>
   </p:clrMapOvr>
+  <p:transition spd="slow">
+    <p:wipe/>
+  </p:transition>
+  <p:timing>
+    <p:tnLst>
+      <p:par>
+        <p:cTn id="1" dur="indefinite" restart="never" nodeType="tmRoot">
+          <p:childTnLst>
+            <p:seq concurrent="1" nextAc="seek">
+              <p:cTn id="2" dur="indefinite" nodeType="mainSeq">
+                <p:childTnLst>
+                  <p:par>
+                    <p:cTn id="3" fill="hold">
+                      <p:stCondLst>
+                        <p:cond delay="indefinite"/>
+                      </p:stCondLst>
+                      <p:childTnLst>
+                        <p:par>
+                          <p:cTn id="4" fill="hold">
+                            <p:stCondLst>
+                              <p:cond delay="0"/>
+                            </p:stCondLst>
+                            <p:childTnLst>
+                              <p:par>
+                                <p:cTn id="5" presetID="2" presetClass="entr" presetSubtype="4" fill="hold" grpId="0" nodeType="clickEffect">
+                                  <p:stCondLst>
+                                    <p:cond delay="200"/>
+                                  </p:stCondLst>
+                                  <p:childTnLst>
+                                    <p:set>
+                                      <p:cBhvr>
+                                        <p:cTn id="6" dur="1" fill="hold">
+                                          <p:stCondLst>
+                                            <p:cond delay="0"/>
+                                          </p:stCondLst>
+                                        </p:cTn>
+                                        <p:tgtEl>
+                                          <p:spTgt spid="3"/>
+                                        </p:tgtEl>
+                                        <p:attrNameLst>
+                                          <p:attrName>style.visibility</p:attrName>
+                                        </p:attrNameLst>
+                                      </p:cBhvr>
+                                      <p:to>
+                                        <p:strVal val="visible"/>
+                                      </p:to>
+                                    </p:set>
+                                    <p:anim calcmode="lin" valueType="num">
+                                      <p:cBhvr additive="base">
+                                        <p:cTn id="7" dur="1200" fill="hold"/>
+                                        <p:tgtEl>
+                                          <p:spTgt spid="3"/>
+                                        </p:tgtEl>
+                                        <p:attrNameLst>
+                                          <p:attrName>ppt_x</p:attrName>
+                                        </p:attrNameLst>
+                                      </p:cBhvr>
+                                      <p:tavLst>
+                                        <p:tav tm="0">
+                                          <p:val>
+                                            <p:strVal val="#ppt_x"/>
+                                          </p:val>
+                                        </p:tav>
+                                        <p:tav tm="100000">
+                                          <p:val>
+                                            <p:strVal val="#ppt_x"/>
+                                          </p:val>
+                                        </p:tav>
+                                      </p:tavLst>
+                                    </p:anim>
+                                    <p:anim calcmode="lin" valueType="num">
+                                      <p:cBhvr additive="base">
+                                        <p:cTn id="8" dur="1200" fill="hold"/>
+                                        <p:tgtEl>
+                                          <p:spTgt spid="3"/>
+                                        </p:tgtEl>
+                                        <p:attrNameLst>
+                                          <p:attrName>ppt_y</p:attrName>
+                                        </p:attrNameLst>
+                                      </p:cBhvr>
+                                      <p:tavLst>
+                                        <p:tav tm="0">
+                                          <p:val>
+                                            <p:strVal val="1+#ppt_h/2"/>
+                                          </p:val>
+                                        </p:tav>
+                                        <p:tav tm="100000">
+                                          <p:val>
+                                            <p:strVal val="#ppt_y"/>
+                                          </p:val>
+                                        </p:tav>
+                                      </p:tavLst>
+                                    </p:anim>
+                                  </p:childTnLst>
+                                </p:cTn>
+                              </p:par>
+                            </p:childTnLst>
+                          </p:cTn>
+                        </p:par>
+                      </p:childTnLst>
+                    </p:cTn>
+                  </p:par>
+                  <p:par>
+                    <p:cTn id="9" fill="hold">
+                      <p:stCondLst>
+                        <p:cond delay="indefinite"/>
+                      </p:stCondLst>
+                      <p:childTnLst>
+                        <p:par>
+                          <p:cTn id="10" fill="hold">
+                            <p:stCondLst>
+                              <p:cond delay="0"/>
+                            </p:stCondLst>
+                            <p:childTnLst>
+                              <p:par>
+                                <p:cTn id="11" presetID="42" presetClass="entr" presetSubtype="0" fill="hold" nodeType="clickEffect">
+                                  <p:stCondLst>
+                                    <p:cond delay="1100"/>
+                                  </p:stCondLst>
+                                  <p:childTnLst>
+                                    <p:set>
+                                      <p:cBhvr>
+                                        <p:cTn id="12" dur="1" fill="hold">
+                                          <p:stCondLst>
+                                            <p:cond delay="0"/>
+                                          </p:stCondLst>
+                                        </p:cTn>
+                                        <p:tgtEl>
+                                          <p:spTgt spid="8"/>
+                                        </p:tgtEl>
+                                        <p:attrNameLst>
+                                          <p:attrName>style.visibility</p:attrName>
+                                        </p:attrNameLst>
+                                      </p:cBhvr>
+                                      <p:to>
+                                        <p:strVal val="visible"/>
+                                      </p:to>
+                                    </p:set>
+                                    <p:animEffect transition="in" filter="fade">
+                                      <p:cBhvr>
+                                        <p:cTn id="13" dur="1400"/>
+                                        <p:tgtEl>
+                                          <p:spTgt spid="8"/>
+                                        </p:tgtEl>
+                                      </p:cBhvr>
+                                    </p:animEffect>
+                                    <p:anim calcmode="lin" valueType="num">
+                                      <p:cBhvr>
+                                        <p:cTn id="14" dur="1400" fill="hold"/>
+                                        <p:tgtEl>
+                                          <p:spTgt spid="8"/>
+                                        </p:tgtEl>
+                                        <p:attrNameLst>
+                                          <p:attrName>ppt_x</p:attrName>
+                                        </p:attrNameLst>
+                                      </p:cBhvr>
+                                      <p:tavLst>
+                                        <p:tav tm="0">
+                                          <p:val>
+                                            <p:strVal val="#ppt_x"/>
+                                          </p:val>
+                                        </p:tav>
+                                        <p:tav tm="100000">
+                                          <p:val>
+                                            <p:strVal val="#ppt_x"/>
+                                          </p:val>
+                                        </p:tav>
+                                      </p:tavLst>
+                                    </p:anim>
+                                    <p:anim calcmode="lin" valueType="num">
+                                      <p:cBhvr>
+                                        <p:cTn id="15" dur="1400" fill="hold"/>
+                                        <p:tgtEl>
+                                          <p:spTgt spid="8"/>
+                                        </p:tgtEl>
+                                        <p:attrNameLst>
+                                          <p:attrName>ppt_y</p:attrName>
+                                        </p:attrNameLst>
+                                      </p:cBhvr>
+                                      <p:tavLst>
+                                        <p:tav tm="0">
+                                          <p:val>
+                                            <p:strVal val="#ppt_y+.1"/>
+                                          </p:val>
+                                        </p:tav>
+                                        <p:tav tm="100000">
+                                          <p:val>
+                                            <p:strVal val="#ppt_y"/>
+                                          </p:val>
+                                        </p:tav>
+                                      </p:tavLst>
+                                    </p:anim>
+                                  </p:childTnLst>
+                                </p:cTn>
+                              </p:par>
+                              <p:par>
+                                <p:cTn id="16" presetID="10" presetClass="entr" presetSubtype="0" fill="hold" grpId="0" nodeType="withEffect">
+                                  <p:stCondLst>
+                                    <p:cond delay="1100"/>
+                                  </p:stCondLst>
+                                  <p:childTnLst>
+                                    <p:set>
+                                      <p:cBhvr>
+                                        <p:cTn id="17" dur="1" fill="hold">
+                                          <p:stCondLst>
+                                            <p:cond delay="0"/>
+                                          </p:stCondLst>
+                                        </p:cTn>
+                                        <p:tgtEl>
+                                          <p:spTgt spid="6"/>
+                                        </p:tgtEl>
+                                        <p:attrNameLst>
+                                          <p:attrName>style.visibility</p:attrName>
+                                        </p:attrNameLst>
+                                      </p:cBhvr>
+                                      <p:to>
+                                        <p:strVal val="visible"/>
+                                      </p:to>
+                                    </p:set>
+                                    <p:animEffect transition="in" filter="fade">
+                                      <p:cBhvr>
+                                        <p:cTn id="18" dur="1200"/>
+                                        <p:tgtEl>
+                                          <p:spTgt spid="6"/>
+                                        </p:tgtEl>
+                                      </p:cBhvr>
+                                    </p:animEffect>
+                                  </p:childTnLst>
+                                </p:cTn>
+                              </p:par>
+                              <p:par>
+                                <p:cTn id="19" presetID="22" presetClass="entr" presetSubtype="4" fill="hold" grpId="0" nodeType="withEffect">
+                                  <p:stCondLst>
+                                    <p:cond delay="1100"/>
+                                  </p:stCondLst>
+                                  <p:childTnLst>
+                                    <p:set>
+                                      <p:cBhvr>
+                                        <p:cTn id="20" dur="1" fill="hold">
+                                          <p:stCondLst>
+                                            <p:cond delay="0"/>
+                                          </p:stCondLst>
+                                        </p:cTn>
+                                        <p:tgtEl>
+                                          <p:spTgt spid="10"/>
+                                        </p:tgtEl>
+                                        <p:attrNameLst>
+                                          <p:attrName>style.visibility</p:attrName>
+                                        </p:attrNameLst>
+                                      </p:cBhvr>
+                                      <p:to>
+                                        <p:strVal val="visible"/>
+                                      </p:to>
+                                    </p:set>
+                                    <p:animEffect transition="in" filter="wipe(down)">
+                                      <p:cBhvr>
+                                        <p:cTn id="21" dur="1200"/>
+                                        <p:tgtEl>
+                                          <p:spTgt spid="10"/>
+                                        </p:tgtEl>
+                                      </p:cBhvr>
+                                    </p:animEffect>
+                                  </p:childTnLst>
+                                </p:cTn>
+                              </p:par>
+                            </p:childTnLst>
+                          </p:cTn>
+                        </p:par>
+                      </p:childTnLst>
+                    </p:cTn>
+                  </p:par>
+                </p:childTnLst>
+              </p:cTn>
+              <p:prevCondLst>
+                <p:cond evt="onPrev" delay="0">
+                  <p:tgtEl>
+                    <p:sldTgt/>
+                  </p:tgtEl>
+                </p:cond>
+              </p:prevCondLst>
+              <p:nextCondLst>
+                <p:cond evt="onNext" delay="0">
+                  <p:tgtEl>
+                    <p:sldTgt/>
+                  </p:tgtEl>
+                </p:cond>
+              </p:nextCondLst>
+            </p:seq>
+          </p:childTnLst>
+        </p:cTn>
+      </p:par>
+    </p:tnLst>
+    <p:bldLst>
+      <p:bldP spid="3" grpId="0" animBg="1"/>
+      <p:bldP spid="6" grpId="0"/>
+      <p:bldP spid="10" grpId="0"/>
+    </p:bldLst>
+  </p:timing>
 </p:sld>
 </file>
 
@@ -5605,7 +6503,7 @@
           <a:p>
             <a:r>
               <a:rPr lang="pt-BR" sz="2400" dirty="0"/>
-              <a:t>NESSA ÉPOCA DE CARNAVAL A GALERA GOSTA DE “APROVEITAR” , ESTANDO SOLTERIO. COM ISSO TEMOS UM GRANDE AUMENTO DE PROPAGAÇÃO DE VÍRUS E BACTÉRIAS, UM DOS PRINCIPAIS EXEMPLOS É O VÍRUS DO HIV . ISSO SE DÁ DEVIDO AS TROCAS DE OBJETOS PESSOAIS, BEIJOS E RELAÇÕES SEXUAIS COM GRANDE QUANTIDADE DE PESSOAS E SEM PROTEÇÃO OU SEM CONHECER O (A) PARCEIRO (A</a:t>
+              <a:t>NESSA ÉPOCA DE CARNAVAL A GALERA GOSTA DE “APROVEITAR” , ESTANDO SOLTEIRO. COM ISSO TEMOS UM GRANDE AUMENTO DE PROPAGAÇÃO DE VÍRUS E BACTÉRIAS, UM DOS PRINCIPAIS EXEMPLOS É O VÍRUS DO HIV . ISSO SE DÁ DEVIDO AS TROCAS DE OBJETOS PESSOAIS, BEIJOS E RELAÇÕES SEXUAIS COM GRANDE QUANTIDADE DE PESSOAS E SEM PROTEÇÃO OU SEM CONHECER O (A) PARCEIRO (A</a:t>
             </a:r>
             <a:r>
               <a:rPr lang="pt-BR" sz="2000" dirty="0"/>
@@ -5624,10 +6522,1683 @@
   <p:clrMapOvr>
     <a:masterClrMapping/>
   </p:clrMapOvr>
+  <p:transition spd="slow">
+    <p:wipe/>
+  </p:transition>
+  <p:timing>
+    <p:tnLst>
+      <p:par>
+        <p:cTn id="1" dur="indefinite" restart="never" nodeType="tmRoot">
+          <p:childTnLst>
+            <p:seq concurrent="1" nextAc="seek">
+              <p:cTn id="2" dur="indefinite" nodeType="mainSeq">
+                <p:childTnLst>
+                  <p:par>
+                    <p:cTn id="3" fill="hold">
+                      <p:stCondLst>
+                        <p:cond delay="indefinite"/>
+                      </p:stCondLst>
+                      <p:childTnLst>
+                        <p:par>
+                          <p:cTn id="4" fill="hold">
+                            <p:stCondLst>
+                              <p:cond delay="0"/>
+                            </p:stCondLst>
+                            <p:childTnLst>
+                              <p:par>
+                                <p:cTn id="5" presetID="2" presetClass="entr" presetSubtype="4" fill="hold" grpId="0" nodeType="clickEffect">
+                                  <p:stCondLst>
+                                    <p:cond delay="0"/>
+                                  </p:stCondLst>
+                                  <p:childTnLst>
+                                    <p:set>
+                                      <p:cBhvr>
+                                        <p:cTn id="6" dur="1" fill="hold">
+                                          <p:stCondLst>
+                                            <p:cond delay="0"/>
+                                          </p:stCondLst>
+                                        </p:cTn>
+                                        <p:tgtEl>
+                                          <p:spTgt spid="2"/>
+                                        </p:tgtEl>
+                                        <p:attrNameLst>
+                                          <p:attrName>style.visibility</p:attrName>
+                                        </p:attrNameLst>
+                                      </p:cBhvr>
+                                      <p:to>
+                                        <p:strVal val="visible"/>
+                                      </p:to>
+                                    </p:set>
+                                    <p:anim calcmode="lin" valueType="num">
+                                      <p:cBhvr additive="base">
+                                        <p:cTn id="7" dur="2200" fill="hold"/>
+                                        <p:tgtEl>
+                                          <p:spTgt spid="2"/>
+                                        </p:tgtEl>
+                                        <p:attrNameLst>
+                                          <p:attrName>ppt_x</p:attrName>
+                                        </p:attrNameLst>
+                                      </p:cBhvr>
+                                      <p:tavLst>
+                                        <p:tav tm="0">
+                                          <p:val>
+                                            <p:strVal val="#ppt_x"/>
+                                          </p:val>
+                                        </p:tav>
+                                        <p:tav tm="100000">
+                                          <p:val>
+                                            <p:strVal val="#ppt_x"/>
+                                          </p:val>
+                                        </p:tav>
+                                      </p:tavLst>
+                                    </p:anim>
+                                    <p:anim calcmode="lin" valueType="num">
+                                      <p:cBhvr additive="base">
+                                        <p:cTn id="8" dur="2200" fill="hold"/>
+                                        <p:tgtEl>
+                                          <p:spTgt spid="2"/>
+                                        </p:tgtEl>
+                                        <p:attrNameLst>
+                                          <p:attrName>ppt_y</p:attrName>
+                                        </p:attrNameLst>
+                                      </p:cBhvr>
+                                      <p:tavLst>
+                                        <p:tav tm="0">
+                                          <p:val>
+                                            <p:strVal val="1+#ppt_h/2"/>
+                                          </p:val>
+                                        </p:tav>
+                                        <p:tav tm="100000">
+                                          <p:val>
+                                            <p:strVal val="#ppt_y"/>
+                                          </p:val>
+                                        </p:tav>
+                                      </p:tavLst>
+                                    </p:anim>
+                                  </p:childTnLst>
+                                </p:cTn>
+                              </p:par>
+                            </p:childTnLst>
+                          </p:cTn>
+                        </p:par>
+                      </p:childTnLst>
+                    </p:cTn>
+                  </p:par>
+                  <p:par>
+                    <p:cTn id="9" fill="hold">
+                      <p:stCondLst>
+                        <p:cond delay="indefinite"/>
+                      </p:stCondLst>
+                      <p:childTnLst>
+                        <p:par>
+                          <p:cTn id="10" fill="hold">
+                            <p:stCondLst>
+                              <p:cond delay="0"/>
+                            </p:stCondLst>
+                            <p:childTnLst>
+                              <p:par>
+                                <p:cTn id="11" presetID="10" presetClass="entr" presetSubtype="0" fill="hold" grpId="0" nodeType="clickEffect">
+                                  <p:stCondLst>
+                                    <p:cond delay="500"/>
+                                  </p:stCondLst>
+                                  <p:childTnLst>
+                                    <p:set>
+                                      <p:cBhvr>
+                                        <p:cTn id="12" dur="1" fill="hold">
+                                          <p:stCondLst>
+                                            <p:cond delay="0"/>
+                                          </p:stCondLst>
+                                        </p:cTn>
+                                        <p:tgtEl>
+                                          <p:spTgt spid="5"/>
+                                        </p:tgtEl>
+                                        <p:attrNameLst>
+                                          <p:attrName>style.visibility</p:attrName>
+                                        </p:attrNameLst>
+                                      </p:cBhvr>
+                                      <p:to>
+                                        <p:strVal val="visible"/>
+                                      </p:to>
+                                    </p:set>
+                                    <p:animEffect transition="in" filter="fade">
+                                      <p:cBhvr>
+                                        <p:cTn id="13" dur="2000"/>
+                                        <p:tgtEl>
+                                          <p:spTgt spid="5"/>
+                                        </p:tgtEl>
+                                      </p:cBhvr>
+                                    </p:animEffect>
+                                  </p:childTnLst>
+                                </p:cTn>
+                              </p:par>
+                              <p:par>
+                                <p:cTn id="14" presetID="42" presetClass="entr" presetSubtype="0" fill="hold" nodeType="withEffect">
+                                  <p:stCondLst>
+                                    <p:cond delay="500"/>
+                                  </p:stCondLst>
+                                  <p:childTnLst>
+                                    <p:set>
+                                      <p:cBhvr>
+                                        <p:cTn id="15" dur="1" fill="hold">
+                                          <p:stCondLst>
+                                            <p:cond delay="0"/>
+                                          </p:stCondLst>
+                                        </p:cTn>
+                                        <p:tgtEl>
+                                          <p:spTgt spid="4"/>
+                                        </p:tgtEl>
+                                        <p:attrNameLst>
+                                          <p:attrName>style.visibility</p:attrName>
+                                        </p:attrNameLst>
+                                      </p:cBhvr>
+                                      <p:to>
+                                        <p:strVal val="visible"/>
+                                      </p:to>
+                                    </p:set>
+                                    <p:animEffect transition="in" filter="fade">
+                                      <p:cBhvr>
+                                        <p:cTn id="16" dur="2000"/>
+                                        <p:tgtEl>
+                                          <p:spTgt spid="4"/>
+                                        </p:tgtEl>
+                                      </p:cBhvr>
+                                    </p:animEffect>
+                                    <p:anim calcmode="lin" valueType="num">
+                                      <p:cBhvr>
+                                        <p:cTn id="17" dur="2000" fill="hold"/>
+                                        <p:tgtEl>
+                                          <p:spTgt spid="4"/>
+                                        </p:tgtEl>
+                                        <p:attrNameLst>
+                                          <p:attrName>ppt_x</p:attrName>
+                                        </p:attrNameLst>
+                                      </p:cBhvr>
+                                      <p:tavLst>
+                                        <p:tav tm="0">
+                                          <p:val>
+                                            <p:strVal val="#ppt_x"/>
+                                          </p:val>
+                                        </p:tav>
+                                        <p:tav tm="100000">
+                                          <p:val>
+                                            <p:strVal val="#ppt_x"/>
+                                          </p:val>
+                                        </p:tav>
+                                      </p:tavLst>
+                                    </p:anim>
+                                    <p:anim calcmode="lin" valueType="num">
+                                      <p:cBhvr>
+                                        <p:cTn id="18" dur="2000" fill="hold"/>
+                                        <p:tgtEl>
+                                          <p:spTgt spid="4"/>
+                                        </p:tgtEl>
+                                        <p:attrNameLst>
+                                          <p:attrName>ppt_y</p:attrName>
+                                        </p:attrNameLst>
+                                      </p:cBhvr>
+                                      <p:tavLst>
+                                        <p:tav tm="0">
+                                          <p:val>
+                                            <p:strVal val="#ppt_y+.1"/>
+                                          </p:val>
+                                        </p:tav>
+                                        <p:tav tm="100000">
+                                          <p:val>
+                                            <p:strVal val="#ppt_y"/>
+                                          </p:val>
+                                        </p:tav>
+                                      </p:tavLst>
+                                    </p:anim>
+                                  </p:childTnLst>
+                                </p:cTn>
+                              </p:par>
+                              <p:par>
+                                <p:cTn id="19" presetID="22" presetClass="entr" presetSubtype="4" fill="hold" grpId="0" nodeType="withEffect">
+                                  <p:stCondLst>
+                                    <p:cond delay="500"/>
+                                  </p:stCondLst>
+                                  <p:childTnLst>
+                                    <p:set>
+                                      <p:cBhvr>
+                                        <p:cTn id="20" dur="1" fill="hold">
+                                          <p:stCondLst>
+                                            <p:cond delay="0"/>
+                                          </p:stCondLst>
+                                        </p:cTn>
+                                        <p:tgtEl>
+                                          <p:spTgt spid="6"/>
+                                        </p:tgtEl>
+                                        <p:attrNameLst>
+                                          <p:attrName>style.visibility</p:attrName>
+                                        </p:attrNameLst>
+                                      </p:cBhvr>
+                                      <p:to>
+                                        <p:strVal val="visible"/>
+                                      </p:to>
+                                    </p:set>
+                                    <p:animEffect transition="in" filter="wipe(down)">
+                                      <p:cBhvr>
+                                        <p:cTn id="21" dur="2300"/>
+                                        <p:tgtEl>
+                                          <p:spTgt spid="6"/>
+                                        </p:tgtEl>
+                                      </p:cBhvr>
+                                    </p:animEffect>
+                                  </p:childTnLst>
+                                </p:cTn>
+                              </p:par>
+                            </p:childTnLst>
+                          </p:cTn>
+                        </p:par>
+                      </p:childTnLst>
+                    </p:cTn>
+                  </p:par>
+                </p:childTnLst>
+              </p:cTn>
+              <p:prevCondLst>
+                <p:cond evt="onPrev" delay="0">
+                  <p:tgtEl>
+                    <p:sldTgt/>
+                  </p:tgtEl>
+                </p:cond>
+              </p:prevCondLst>
+              <p:nextCondLst>
+                <p:cond evt="onNext" delay="0">
+                  <p:tgtEl>
+                    <p:sldTgt/>
+                  </p:tgtEl>
+                </p:cond>
+              </p:nextCondLst>
+            </p:seq>
+          </p:childTnLst>
+        </p:cTn>
+      </p:par>
+    </p:tnLst>
+    <p:bldLst>
+      <p:bldP spid="2" grpId="0" animBg="1"/>
+      <p:bldP spid="5" grpId="0"/>
+      <p:bldP spid="6" grpId="0"/>
+    </p:bldLst>
+  </p:timing>
 </p:sld>
 </file>
 
 <file path=ppt/slides/slide6.xml><?xml version="1.0" encoding="utf-8"?>
+<p:sld xmlns:a="http://schemas.openxmlformats.org/drawingml/2006/main" xmlns:r="http://schemas.openxmlformats.org/officeDocument/2006/relationships" xmlns:p="http://schemas.openxmlformats.org/presentationml/2006/main">
+  <p:cSld>
+    <p:spTree>
+      <p:nvGrpSpPr>
+        <p:cNvPr id="1" name=""/>
+        <p:cNvGrpSpPr/>
+        <p:nvPr/>
+      </p:nvGrpSpPr>
+      <p:grpSpPr>
+        <a:xfrm>
+          <a:off x="0" y="0"/>
+          <a:ext cx="0" cy="0"/>
+          <a:chOff x="0" y="0"/>
+          <a:chExt cx="0" cy="0"/>
+        </a:xfrm>
+      </p:grpSpPr>
+      <p:grpSp>
+        <p:nvGrpSpPr>
+          <p:cNvPr id="19" name="Agrupar 18">
+            <a:extLst>
+              <a:ext uri="{FF2B5EF4-FFF2-40B4-BE49-F238E27FC236}">
+                <a16:creationId xmlns:a16="http://schemas.microsoft.com/office/drawing/2014/main" id="{DF3AF855-B4F1-F3A5-8EE5-8AD6D4113ADC}"/>
+              </a:ext>
+            </a:extLst>
+          </p:cNvPr>
+          <p:cNvGrpSpPr/>
+          <p:nvPr/>
+        </p:nvGrpSpPr>
+        <p:grpSpPr>
+          <a:xfrm>
+            <a:off x="419724" y="159953"/>
+            <a:ext cx="10598046" cy="1328365"/>
+            <a:chOff x="419724" y="159953"/>
+            <a:chExt cx="10598046" cy="1328365"/>
+          </a:xfrm>
+        </p:grpSpPr>
+        <p:sp>
+          <p:nvSpPr>
+            <p:cNvPr id="7" name="Retângulo: Cantos Arredondados 6">
+              <a:extLst>
+                <a:ext uri="{FF2B5EF4-FFF2-40B4-BE49-F238E27FC236}">
+                  <a16:creationId xmlns:a16="http://schemas.microsoft.com/office/drawing/2014/main" id="{CC4A73AD-2A40-B00D-E970-39ADB66B7E9E}"/>
+                </a:ext>
+              </a:extLst>
+            </p:cNvPr>
+            <p:cNvSpPr/>
+            <p:nvPr/>
+          </p:nvSpPr>
+          <p:spPr>
+            <a:xfrm>
+              <a:off x="419724" y="192351"/>
+              <a:ext cx="10598046" cy="1295967"/>
+            </a:xfrm>
+            <a:prstGeom prst="roundRect">
+              <a:avLst>
+                <a:gd name="adj" fmla="val 10000"/>
+              </a:avLst>
+            </a:prstGeom>
+          </p:spPr>
+          <p:style>
+            <a:lnRef idx="0">
+              <a:schemeClr val="dk1">
+                <a:hueOff val="0"/>
+                <a:satOff val="0"/>
+                <a:lumOff val="0"/>
+                <a:alphaOff val="0"/>
+              </a:schemeClr>
+            </a:lnRef>
+            <a:fillRef idx="1">
+              <a:schemeClr val="accent2">
+                <a:tint val="40000"/>
+                <a:hueOff val="0"/>
+                <a:satOff val="0"/>
+                <a:lumOff val="0"/>
+                <a:alphaOff val="0"/>
+              </a:schemeClr>
+            </a:fillRef>
+            <a:effectRef idx="0">
+              <a:schemeClr val="accent2">
+                <a:tint val="40000"/>
+                <a:hueOff val="0"/>
+                <a:satOff val="0"/>
+                <a:lumOff val="0"/>
+                <a:alphaOff val="0"/>
+              </a:schemeClr>
+            </a:effectRef>
+            <a:fontRef idx="minor">
+              <a:schemeClr val="dk1">
+                <a:hueOff val="0"/>
+                <a:satOff val="0"/>
+                <a:lumOff val="0"/>
+                <a:alphaOff val="0"/>
+              </a:schemeClr>
+            </a:fontRef>
+          </p:style>
+          <p:txBody>
+            <a:bodyPr/>
+            <a:lstStyle/>
+            <a:p>
+              <a:endParaRPr lang="pt-BR"/>
+            </a:p>
+          </p:txBody>
+        </p:sp>
+        <p:sp>
+          <p:nvSpPr>
+            <p:cNvPr id="8" name="Retângulo 7" descr="Electric Car">
+              <a:extLst>
+                <a:ext uri="{FF2B5EF4-FFF2-40B4-BE49-F238E27FC236}">
+                  <a16:creationId xmlns:a16="http://schemas.microsoft.com/office/drawing/2014/main" id="{7633E375-8814-5FFE-C5DA-1B4B73C698AE}"/>
+                </a:ext>
+              </a:extLst>
+            </p:cNvPr>
+            <p:cNvSpPr/>
+            <p:nvPr/>
+          </p:nvSpPr>
+          <p:spPr>
+            <a:xfrm>
+              <a:off x="811754" y="451545"/>
+              <a:ext cx="712781" cy="712781"/>
+            </a:xfrm>
+            <a:prstGeom prst="rect">
+              <a:avLst/>
+            </a:prstGeom>
+            <a:blipFill>
+              <a:blip r:embed="rId2">
+                <a:extLst>
+                  <a:ext uri="{28A0092B-C50C-407E-A947-70E740481C1C}">
+                    <a14:useLocalDpi xmlns:a14="http://schemas.microsoft.com/office/drawing/2010/main" val="0"/>
+                  </a:ext>
+                  <a:ext uri="{96DAC541-7B7A-43D3-8B79-37D633B846F1}">
+                    <asvg:svgBlip xmlns:asvg="http://schemas.microsoft.com/office/drawing/2016/SVG/main" r:embed="rId3"/>
+                  </a:ext>
+                </a:extLst>
+              </a:blip>
+              <a:stretch>
+                <a:fillRect/>
+              </a:stretch>
+            </a:blipFill>
+          </p:spPr>
+          <p:style>
+            <a:lnRef idx="3">
+              <a:schemeClr val="lt1">
+                <a:hueOff val="0"/>
+                <a:satOff val="0"/>
+                <a:lumOff val="0"/>
+                <a:alphaOff val="0"/>
+              </a:schemeClr>
+            </a:lnRef>
+            <a:fillRef idx="1">
+              <a:scrgbClr r="0" g="0" b="0"/>
+            </a:fillRef>
+            <a:effectRef idx="1">
+              <a:schemeClr val="accent2">
+                <a:shade val="80000"/>
+                <a:hueOff val="0"/>
+                <a:satOff val="0"/>
+                <a:lumOff val="0"/>
+                <a:alphaOff val="0"/>
+              </a:schemeClr>
+            </a:effectRef>
+            <a:fontRef idx="minor">
+              <a:schemeClr val="lt1"/>
+            </a:fontRef>
+          </p:style>
+          <p:txBody>
+            <a:bodyPr/>
+            <a:lstStyle/>
+            <a:p>
+              <a:endParaRPr lang="pt-BR"/>
+            </a:p>
+          </p:txBody>
+        </p:sp>
+        <p:sp>
+          <p:nvSpPr>
+            <p:cNvPr id="9" name="Forma Livre: Forma 8">
+              <a:extLst>
+                <a:ext uri="{FF2B5EF4-FFF2-40B4-BE49-F238E27FC236}">
+                  <a16:creationId xmlns:a16="http://schemas.microsoft.com/office/drawing/2014/main" id="{1EB83E48-E794-8177-0197-E0BF417B3256}"/>
+                </a:ext>
+              </a:extLst>
+            </p:cNvPr>
+            <p:cNvSpPr/>
+            <p:nvPr/>
+          </p:nvSpPr>
+          <p:spPr>
+            <a:xfrm>
+              <a:off x="1916566" y="159953"/>
+              <a:ext cx="9101203" cy="1295967"/>
+            </a:xfrm>
+            <a:custGeom>
+              <a:avLst/>
+              <a:gdLst>
+                <a:gd name="connsiteX0" fmla="*/ 0 w 9101203"/>
+                <a:gd name="connsiteY0" fmla="*/ 0 h 1295967"/>
+                <a:gd name="connsiteX1" fmla="*/ 9101203 w 9101203"/>
+                <a:gd name="connsiteY1" fmla="*/ 0 h 1295967"/>
+                <a:gd name="connsiteX2" fmla="*/ 9101203 w 9101203"/>
+                <a:gd name="connsiteY2" fmla="*/ 1295967 h 1295967"/>
+                <a:gd name="connsiteX3" fmla="*/ 0 w 9101203"/>
+                <a:gd name="connsiteY3" fmla="*/ 1295967 h 1295967"/>
+                <a:gd name="connsiteX4" fmla="*/ 0 w 9101203"/>
+                <a:gd name="connsiteY4" fmla="*/ 0 h 1295967"/>
+              </a:gdLst>
+              <a:ahLst/>
+              <a:cxnLst>
+                <a:cxn ang="0">
+                  <a:pos x="connsiteX0" y="connsiteY0"/>
+                </a:cxn>
+                <a:cxn ang="0">
+                  <a:pos x="connsiteX1" y="connsiteY1"/>
+                </a:cxn>
+                <a:cxn ang="0">
+                  <a:pos x="connsiteX2" y="connsiteY2"/>
+                </a:cxn>
+                <a:cxn ang="0">
+                  <a:pos x="connsiteX3" y="connsiteY3"/>
+                </a:cxn>
+                <a:cxn ang="0">
+                  <a:pos x="connsiteX4" y="connsiteY4"/>
+                </a:cxn>
+              </a:cxnLst>
+              <a:rect l="l" t="t" r="r" b="b"/>
+              <a:pathLst>
+                <a:path w="9101203" h="1295967">
+                  <a:moveTo>
+                    <a:pt x="0" y="0"/>
+                  </a:moveTo>
+                  <a:lnTo>
+                    <a:pt x="9101203" y="0"/>
+                  </a:lnTo>
+                  <a:lnTo>
+                    <a:pt x="9101203" y="1295967"/>
+                  </a:lnTo>
+                  <a:lnTo>
+                    <a:pt x="0" y="1295967"/>
+                  </a:lnTo>
+                  <a:lnTo>
+                    <a:pt x="0" y="0"/>
+                  </a:lnTo>
+                  <a:close/>
+                </a:path>
+              </a:pathLst>
+            </a:custGeom>
+          </p:spPr>
+          <p:style>
+            <a:lnRef idx="0">
+              <a:schemeClr val="dk1">
+                <a:alpha val="0"/>
+                <a:hueOff val="0"/>
+                <a:satOff val="0"/>
+                <a:lumOff val="0"/>
+                <a:alphaOff val="0"/>
+              </a:schemeClr>
+            </a:lnRef>
+            <a:fillRef idx="0">
+              <a:schemeClr val="lt1">
+                <a:alpha val="0"/>
+                <a:hueOff val="0"/>
+                <a:satOff val="0"/>
+                <a:lumOff val="0"/>
+                <a:alphaOff val="0"/>
+              </a:schemeClr>
+            </a:fillRef>
+            <a:effectRef idx="0">
+              <a:schemeClr val="lt1">
+                <a:alpha val="0"/>
+                <a:hueOff val="0"/>
+                <a:satOff val="0"/>
+                <a:lumOff val="0"/>
+                <a:alphaOff val="0"/>
+              </a:schemeClr>
+            </a:effectRef>
+            <a:fontRef idx="minor">
+              <a:schemeClr val="tx1">
+                <a:hueOff val="0"/>
+                <a:satOff val="0"/>
+                <a:lumOff val="0"/>
+                <a:alphaOff val="0"/>
+              </a:schemeClr>
+            </a:fontRef>
+          </p:style>
+          <p:txBody>
+            <a:bodyPr spcFirstLastPara="0" vert="horz" wrap="square" lIns="137157" tIns="137157" rIns="137157" bIns="137157" numCol="1" spcCol="1270" anchor="ctr" anchorCtr="0">
+              <a:noAutofit/>
+            </a:bodyPr>
+            <a:lstStyle/>
+            <a:p>
+              <a:pPr marL="0" lvl="0" indent="0" algn="l" defTabSz="977900">
+                <a:lnSpc>
+                  <a:spcPct val="100000"/>
+                </a:lnSpc>
+                <a:spcBef>
+                  <a:spcPct val="0"/>
+                </a:spcBef>
+                <a:spcAft>
+                  <a:spcPct val="35000"/>
+                </a:spcAft>
+                <a:buNone/>
+              </a:pPr>
+              <a:r>
+                <a:rPr lang="pt-BR" sz="2200" kern="1200" dirty="0"/>
+                <a:t>Poluição </a:t>
+              </a:r>
+            </a:p>
+          </p:txBody>
+        </p:sp>
+      </p:grpSp>
+      <p:grpSp>
+        <p:nvGrpSpPr>
+          <p:cNvPr id="26" name="Agrupar 25">
+            <a:extLst>
+              <a:ext uri="{FF2B5EF4-FFF2-40B4-BE49-F238E27FC236}">
+                <a16:creationId xmlns:a16="http://schemas.microsoft.com/office/drawing/2014/main" id="{1DC0F331-0DE1-13C9-4DE8-FC720334FBDD}"/>
+              </a:ext>
+            </a:extLst>
+          </p:cNvPr>
+          <p:cNvGrpSpPr/>
+          <p:nvPr/>
+        </p:nvGrpSpPr>
+        <p:grpSpPr>
+          <a:xfrm>
+            <a:off x="419721" y="1791129"/>
+            <a:ext cx="10598046" cy="1295968"/>
+            <a:chOff x="419721" y="1775252"/>
+            <a:chExt cx="10598046" cy="1295968"/>
+          </a:xfrm>
+        </p:grpSpPr>
+        <p:sp>
+          <p:nvSpPr>
+            <p:cNvPr id="10" name="Retângulo: Cantos Arredondados 9">
+              <a:extLst>
+                <a:ext uri="{FF2B5EF4-FFF2-40B4-BE49-F238E27FC236}">
+                  <a16:creationId xmlns:a16="http://schemas.microsoft.com/office/drawing/2014/main" id="{7BF092CD-5DF8-970B-8EBF-99D313D96D7D}"/>
+                </a:ext>
+              </a:extLst>
+            </p:cNvPr>
+            <p:cNvSpPr/>
+            <p:nvPr/>
+          </p:nvSpPr>
+          <p:spPr>
+            <a:xfrm>
+              <a:off x="419721" y="1775252"/>
+              <a:ext cx="10598046" cy="1295967"/>
+            </a:xfrm>
+            <a:prstGeom prst="roundRect">
+              <a:avLst>
+                <a:gd name="adj" fmla="val 10000"/>
+              </a:avLst>
+            </a:prstGeom>
+          </p:spPr>
+          <p:style>
+            <a:lnRef idx="0">
+              <a:schemeClr val="dk1">
+                <a:hueOff val="0"/>
+                <a:satOff val="0"/>
+                <a:lumOff val="0"/>
+                <a:alphaOff val="0"/>
+              </a:schemeClr>
+            </a:lnRef>
+            <a:fillRef idx="1">
+              <a:schemeClr val="accent2">
+                <a:tint val="40000"/>
+                <a:hueOff val="0"/>
+                <a:satOff val="0"/>
+                <a:lumOff val="0"/>
+                <a:alphaOff val="0"/>
+              </a:schemeClr>
+            </a:fillRef>
+            <a:effectRef idx="0">
+              <a:schemeClr val="accent2">
+                <a:tint val="40000"/>
+                <a:hueOff val="0"/>
+                <a:satOff val="0"/>
+                <a:lumOff val="0"/>
+                <a:alphaOff val="0"/>
+              </a:schemeClr>
+            </a:effectRef>
+            <a:fontRef idx="minor">
+              <a:schemeClr val="dk1">
+                <a:hueOff val="0"/>
+                <a:satOff val="0"/>
+                <a:lumOff val="0"/>
+                <a:alphaOff val="0"/>
+              </a:schemeClr>
+            </a:fontRef>
+          </p:style>
+          <p:txBody>
+            <a:bodyPr/>
+            <a:lstStyle/>
+            <a:p>
+              <a:endParaRPr lang="pt-BR"/>
+            </a:p>
+          </p:txBody>
+        </p:sp>
+        <p:grpSp>
+          <p:nvGrpSpPr>
+            <p:cNvPr id="20" name="Agrupar 19">
+              <a:extLst>
+                <a:ext uri="{FF2B5EF4-FFF2-40B4-BE49-F238E27FC236}">
+                  <a16:creationId xmlns:a16="http://schemas.microsoft.com/office/drawing/2014/main" id="{7D85E8BF-701E-B710-8844-C0AEEC1564B2}"/>
+                </a:ext>
+              </a:extLst>
+            </p:cNvPr>
+            <p:cNvGrpSpPr/>
+            <p:nvPr/>
+          </p:nvGrpSpPr>
+          <p:grpSpPr>
+            <a:xfrm>
+              <a:off x="811752" y="1775253"/>
+              <a:ext cx="10206015" cy="1295967"/>
+              <a:chOff x="811754" y="1779911"/>
+              <a:chExt cx="10206015" cy="1295967"/>
+            </a:xfrm>
+          </p:grpSpPr>
+          <p:sp>
+            <p:nvSpPr>
+              <p:cNvPr id="11" name="Retângulo 10" descr="Ladrão">
+                <a:extLst>
+                  <a:ext uri="{FF2B5EF4-FFF2-40B4-BE49-F238E27FC236}">
+                    <a16:creationId xmlns:a16="http://schemas.microsoft.com/office/drawing/2014/main" id="{0167B6ED-1519-CD93-F1AD-205AEC9D4BCC}"/>
+                  </a:ext>
+                </a:extLst>
+              </p:cNvPr>
+              <p:cNvSpPr/>
+              <p:nvPr/>
+            </p:nvSpPr>
+            <p:spPr>
+              <a:xfrm>
+                <a:off x="811754" y="2071504"/>
+                <a:ext cx="712781" cy="712781"/>
+              </a:xfrm>
+              <a:prstGeom prst="rect">
+                <a:avLst/>
+              </a:prstGeom>
+              <a:blipFill>
+                <a:blip r:embed="rId4">
+                  <a:extLst>
+                    <a:ext uri="{28A0092B-C50C-407E-A947-70E740481C1C}">
+                      <a14:useLocalDpi xmlns:a14="http://schemas.microsoft.com/office/drawing/2010/main" val="0"/>
+                    </a:ext>
+                    <a:ext uri="{96DAC541-7B7A-43D3-8B79-37D633B846F1}">
+                      <asvg:svgBlip xmlns:asvg="http://schemas.microsoft.com/office/drawing/2016/SVG/main" r:embed="rId5"/>
+                    </a:ext>
+                  </a:extLst>
+                </a:blip>
+                <a:stretch>
+                  <a:fillRect/>
+                </a:stretch>
+              </a:blipFill>
+            </p:spPr>
+            <p:style>
+              <a:lnRef idx="3">
+                <a:schemeClr val="lt1">
+                  <a:hueOff val="0"/>
+                  <a:satOff val="0"/>
+                  <a:lumOff val="0"/>
+                  <a:alphaOff val="0"/>
+                </a:schemeClr>
+              </a:lnRef>
+              <a:fillRef idx="1">
+                <a:scrgbClr r="0" g="0" b="0"/>
+              </a:fillRef>
+              <a:effectRef idx="1">
+                <a:schemeClr val="accent2">
+                  <a:shade val="80000"/>
+                  <a:hueOff val="-151668"/>
+                  <a:satOff val="2837"/>
+                  <a:lumOff val="9040"/>
+                  <a:alphaOff val="0"/>
+                </a:schemeClr>
+              </a:effectRef>
+              <a:fontRef idx="minor">
+                <a:schemeClr val="lt1"/>
+              </a:fontRef>
+            </p:style>
+            <p:txBody>
+              <a:bodyPr/>
+              <a:lstStyle/>
+              <a:p>
+                <a:endParaRPr lang="pt-BR" dirty="0"/>
+              </a:p>
+            </p:txBody>
+          </p:sp>
+          <p:sp>
+            <p:nvSpPr>
+              <p:cNvPr id="12" name="Forma Livre: Forma 11">
+                <a:extLst>
+                  <a:ext uri="{FF2B5EF4-FFF2-40B4-BE49-F238E27FC236}">
+                    <a16:creationId xmlns:a16="http://schemas.microsoft.com/office/drawing/2014/main" id="{02F6A4F8-FADB-2781-BFEB-85B448C6DA53}"/>
+                  </a:ext>
+                </a:extLst>
+              </p:cNvPr>
+              <p:cNvSpPr/>
+              <p:nvPr/>
+            </p:nvSpPr>
+            <p:spPr>
+              <a:xfrm>
+                <a:off x="1916566" y="1779911"/>
+                <a:ext cx="9101203" cy="1295967"/>
+              </a:xfrm>
+              <a:custGeom>
+                <a:avLst/>
+                <a:gdLst>
+                  <a:gd name="connsiteX0" fmla="*/ 0 w 9101203"/>
+                  <a:gd name="connsiteY0" fmla="*/ 0 h 1295967"/>
+                  <a:gd name="connsiteX1" fmla="*/ 9101203 w 9101203"/>
+                  <a:gd name="connsiteY1" fmla="*/ 0 h 1295967"/>
+                  <a:gd name="connsiteX2" fmla="*/ 9101203 w 9101203"/>
+                  <a:gd name="connsiteY2" fmla="*/ 1295967 h 1295967"/>
+                  <a:gd name="connsiteX3" fmla="*/ 0 w 9101203"/>
+                  <a:gd name="connsiteY3" fmla="*/ 1295967 h 1295967"/>
+                  <a:gd name="connsiteX4" fmla="*/ 0 w 9101203"/>
+                  <a:gd name="connsiteY4" fmla="*/ 0 h 1295967"/>
+                </a:gdLst>
+                <a:ahLst/>
+                <a:cxnLst>
+                  <a:cxn ang="0">
+                    <a:pos x="connsiteX0" y="connsiteY0"/>
+                  </a:cxn>
+                  <a:cxn ang="0">
+                    <a:pos x="connsiteX1" y="connsiteY1"/>
+                  </a:cxn>
+                  <a:cxn ang="0">
+                    <a:pos x="connsiteX2" y="connsiteY2"/>
+                  </a:cxn>
+                  <a:cxn ang="0">
+                    <a:pos x="connsiteX3" y="connsiteY3"/>
+                  </a:cxn>
+                  <a:cxn ang="0">
+                    <a:pos x="connsiteX4" y="connsiteY4"/>
+                  </a:cxn>
+                </a:cxnLst>
+                <a:rect l="l" t="t" r="r" b="b"/>
+                <a:pathLst>
+                  <a:path w="9101203" h="1295967">
+                    <a:moveTo>
+                      <a:pt x="0" y="0"/>
+                    </a:moveTo>
+                    <a:lnTo>
+                      <a:pt x="9101203" y="0"/>
+                    </a:lnTo>
+                    <a:lnTo>
+                      <a:pt x="9101203" y="1295967"/>
+                    </a:lnTo>
+                    <a:lnTo>
+                      <a:pt x="0" y="1295967"/>
+                    </a:lnTo>
+                    <a:lnTo>
+                      <a:pt x="0" y="0"/>
+                    </a:lnTo>
+                    <a:close/>
+                  </a:path>
+                </a:pathLst>
+              </a:custGeom>
+            </p:spPr>
+            <p:style>
+              <a:lnRef idx="0">
+                <a:schemeClr val="dk1">
+                  <a:alpha val="0"/>
+                  <a:hueOff val="0"/>
+                  <a:satOff val="0"/>
+                  <a:lumOff val="0"/>
+                  <a:alphaOff val="0"/>
+                </a:schemeClr>
+              </a:lnRef>
+              <a:fillRef idx="0">
+                <a:schemeClr val="lt1">
+                  <a:alpha val="0"/>
+                  <a:hueOff val="0"/>
+                  <a:satOff val="0"/>
+                  <a:lumOff val="0"/>
+                  <a:alphaOff val="0"/>
+                </a:schemeClr>
+              </a:fillRef>
+              <a:effectRef idx="0">
+                <a:schemeClr val="lt1">
+                  <a:alpha val="0"/>
+                  <a:hueOff val="0"/>
+                  <a:satOff val="0"/>
+                  <a:lumOff val="0"/>
+                  <a:alphaOff val="0"/>
+                </a:schemeClr>
+              </a:effectRef>
+              <a:fontRef idx="minor">
+                <a:schemeClr val="tx1">
+                  <a:hueOff val="0"/>
+                  <a:satOff val="0"/>
+                  <a:lumOff val="0"/>
+                  <a:alphaOff val="0"/>
+                </a:schemeClr>
+              </a:fontRef>
+            </p:style>
+            <p:txBody>
+              <a:bodyPr spcFirstLastPara="0" vert="horz" wrap="square" lIns="137157" tIns="137157" rIns="137157" bIns="137157" numCol="1" spcCol="1270" anchor="ctr" anchorCtr="0">
+                <a:noAutofit/>
+              </a:bodyPr>
+              <a:lstStyle/>
+              <a:p>
+                <a:pPr marL="0" lvl="0" indent="0" algn="l" defTabSz="977900">
+                  <a:lnSpc>
+                    <a:spcPct val="100000"/>
+                  </a:lnSpc>
+                  <a:spcBef>
+                    <a:spcPct val="0"/>
+                  </a:spcBef>
+                  <a:spcAft>
+                    <a:spcPct val="35000"/>
+                  </a:spcAft>
+                  <a:buNone/>
+                </a:pPr>
+                <a:r>
+                  <a:rPr lang="pt-BR" sz="2200" kern="1200" dirty="0"/>
+                  <a:t>Furtos e Roubos</a:t>
+                </a:r>
+              </a:p>
+            </p:txBody>
+          </p:sp>
+        </p:grpSp>
+      </p:grpSp>
+      <p:grpSp>
+        <p:nvGrpSpPr>
+          <p:cNvPr id="22" name="Agrupar 21">
+            <a:extLst>
+              <a:ext uri="{FF2B5EF4-FFF2-40B4-BE49-F238E27FC236}">
+                <a16:creationId xmlns:a16="http://schemas.microsoft.com/office/drawing/2014/main" id="{FFC9BDC5-B510-E4D8-0988-256A9AD18322}"/>
+              </a:ext>
+            </a:extLst>
+          </p:cNvPr>
+          <p:cNvGrpSpPr/>
+          <p:nvPr/>
+        </p:nvGrpSpPr>
+        <p:grpSpPr>
+          <a:xfrm>
+            <a:off x="419723" y="3378690"/>
+            <a:ext cx="10598046" cy="1295967"/>
+            <a:chOff x="419724" y="3399870"/>
+            <a:chExt cx="10598046" cy="1295967"/>
+          </a:xfrm>
+        </p:grpSpPr>
+        <p:sp>
+          <p:nvSpPr>
+            <p:cNvPr id="13" name="Retângulo: Cantos Arredondados 12">
+              <a:extLst>
+                <a:ext uri="{FF2B5EF4-FFF2-40B4-BE49-F238E27FC236}">
+                  <a16:creationId xmlns:a16="http://schemas.microsoft.com/office/drawing/2014/main" id="{32A700E3-D0E4-8055-8B9A-52296ADB1C0F}"/>
+                </a:ext>
+              </a:extLst>
+            </p:cNvPr>
+            <p:cNvSpPr/>
+            <p:nvPr/>
+          </p:nvSpPr>
+          <p:spPr>
+            <a:xfrm>
+              <a:off x="419724" y="3399870"/>
+              <a:ext cx="10598046" cy="1295967"/>
+            </a:xfrm>
+            <a:prstGeom prst="roundRect">
+              <a:avLst>
+                <a:gd name="adj" fmla="val 10000"/>
+              </a:avLst>
+            </a:prstGeom>
+          </p:spPr>
+          <p:style>
+            <a:lnRef idx="0">
+              <a:schemeClr val="dk1">
+                <a:hueOff val="0"/>
+                <a:satOff val="0"/>
+                <a:lumOff val="0"/>
+                <a:alphaOff val="0"/>
+              </a:schemeClr>
+            </a:lnRef>
+            <a:fillRef idx="1">
+              <a:schemeClr val="accent2">
+                <a:tint val="40000"/>
+                <a:hueOff val="0"/>
+                <a:satOff val="0"/>
+                <a:lumOff val="0"/>
+                <a:alphaOff val="0"/>
+              </a:schemeClr>
+            </a:fillRef>
+            <a:effectRef idx="0">
+              <a:schemeClr val="accent2">
+                <a:tint val="40000"/>
+                <a:hueOff val="0"/>
+                <a:satOff val="0"/>
+                <a:lumOff val="0"/>
+                <a:alphaOff val="0"/>
+              </a:schemeClr>
+            </a:effectRef>
+            <a:fontRef idx="minor">
+              <a:schemeClr val="dk1">
+                <a:hueOff val="0"/>
+                <a:satOff val="0"/>
+                <a:lumOff val="0"/>
+                <a:alphaOff val="0"/>
+              </a:schemeClr>
+            </a:fontRef>
+          </p:style>
+          <p:txBody>
+            <a:bodyPr/>
+            <a:lstStyle/>
+            <a:p>
+              <a:endParaRPr lang="pt-BR"/>
+            </a:p>
+          </p:txBody>
+        </p:sp>
+        <p:sp>
+          <p:nvSpPr>
+            <p:cNvPr id="14" name="Retângulo 13" descr="Dança">
+              <a:extLst>
+                <a:ext uri="{FF2B5EF4-FFF2-40B4-BE49-F238E27FC236}">
+                  <a16:creationId xmlns:a16="http://schemas.microsoft.com/office/drawing/2014/main" id="{46D4D3FB-2769-CAFE-1946-549378E1EB50}"/>
+                </a:ext>
+              </a:extLst>
+            </p:cNvPr>
+            <p:cNvSpPr/>
+            <p:nvPr/>
+          </p:nvSpPr>
+          <p:spPr>
+            <a:xfrm>
+              <a:off x="811754" y="3691463"/>
+              <a:ext cx="712781" cy="712781"/>
+            </a:xfrm>
+            <a:prstGeom prst="rect">
+              <a:avLst/>
+            </a:prstGeom>
+            <a:blipFill>
+              <a:blip r:embed="rId6">
+                <a:extLst>
+                  <a:ext uri="{28A0092B-C50C-407E-A947-70E740481C1C}">
+                    <a14:useLocalDpi xmlns:a14="http://schemas.microsoft.com/office/drawing/2010/main" val="0"/>
+                  </a:ext>
+                  <a:ext uri="{96DAC541-7B7A-43D3-8B79-37D633B846F1}">
+                    <asvg:svgBlip xmlns:asvg="http://schemas.microsoft.com/office/drawing/2016/SVG/main" r:embed="rId7"/>
+                  </a:ext>
+                </a:extLst>
+              </a:blip>
+              <a:stretch>
+                <a:fillRect/>
+              </a:stretch>
+            </a:blipFill>
+          </p:spPr>
+          <p:style>
+            <a:lnRef idx="3">
+              <a:schemeClr val="lt1">
+                <a:hueOff val="0"/>
+                <a:satOff val="0"/>
+                <a:lumOff val="0"/>
+                <a:alphaOff val="0"/>
+              </a:schemeClr>
+            </a:lnRef>
+            <a:fillRef idx="1">
+              <a:scrgbClr r="0" g="0" b="0"/>
+            </a:fillRef>
+            <a:effectRef idx="1">
+              <a:schemeClr val="accent2">
+                <a:shade val="80000"/>
+                <a:hueOff val="-303336"/>
+                <a:satOff val="5673"/>
+                <a:lumOff val="18081"/>
+                <a:alphaOff val="0"/>
+              </a:schemeClr>
+            </a:effectRef>
+            <a:fontRef idx="minor">
+              <a:schemeClr val="lt1"/>
+            </a:fontRef>
+          </p:style>
+          <p:txBody>
+            <a:bodyPr/>
+            <a:lstStyle/>
+            <a:p>
+              <a:endParaRPr lang="pt-BR"/>
+            </a:p>
+          </p:txBody>
+        </p:sp>
+        <p:sp>
+          <p:nvSpPr>
+            <p:cNvPr id="15" name="Forma Livre: Forma 14">
+              <a:extLst>
+                <a:ext uri="{FF2B5EF4-FFF2-40B4-BE49-F238E27FC236}">
+                  <a16:creationId xmlns:a16="http://schemas.microsoft.com/office/drawing/2014/main" id="{6F288736-866D-FCFE-5646-DD5B54D72825}"/>
+                </a:ext>
+              </a:extLst>
+            </p:cNvPr>
+            <p:cNvSpPr/>
+            <p:nvPr/>
+          </p:nvSpPr>
+          <p:spPr>
+            <a:xfrm>
+              <a:off x="1916566" y="3399870"/>
+              <a:ext cx="9101203" cy="1295967"/>
+            </a:xfrm>
+            <a:custGeom>
+              <a:avLst/>
+              <a:gdLst>
+                <a:gd name="connsiteX0" fmla="*/ 0 w 9101203"/>
+                <a:gd name="connsiteY0" fmla="*/ 0 h 1295967"/>
+                <a:gd name="connsiteX1" fmla="*/ 9101203 w 9101203"/>
+                <a:gd name="connsiteY1" fmla="*/ 0 h 1295967"/>
+                <a:gd name="connsiteX2" fmla="*/ 9101203 w 9101203"/>
+                <a:gd name="connsiteY2" fmla="*/ 1295967 h 1295967"/>
+                <a:gd name="connsiteX3" fmla="*/ 0 w 9101203"/>
+                <a:gd name="connsiteY3" fmla="*/ 1295967 h 1295967"/>
+                <a:gd name="connsiteX4" fmla="*/ 0 w 9101203"/>
+                <a:gd name="connsiteY4" fmla="*/ 0 h 1295967"/>
+              </a:gdLst>
+              <a:ahLst/>
+              <a:cxnLst>
+                <a:cxn ang="0">
+                  <a:pos x="connsiteX0" y="connsiteY0"/>
+                </a:cxn>
+                <a:cxn ang="0">
+                  <a:pos x="connsiteX1" y="connsiteY1"/>
+                </a:cxn>
+                <a:cxn ang="0">
+                  <a:pos x="connsiteX2" y="connsiteY2"/>
+                </a:cxn>
+                <a:cxn ang="0">
+                  <a:pos x="connsiteX3" y="connsiteY3"/>
+                </a:cxn>
+                <a:cxn ang="0">
+                  <a:pos x="connsiteX4" y="connsiteY4"/>
+                </a:cxn>
+              </a:cxnLst>
+              <a:rect l="l" t="t" r="r" b="b"/>
+              <a:pathLst>
+                <a:path w="9101203" h="1295967">
+                  <a:moveTo>
+                    <a:pt x="0" y="0"/>
+                  </a:moveTo>
+                  <a:lnTo>
+                    <a:pt x="9101203" y="0"/>
+                  </a:lnTo>
+                  <a:lnTo>
+                    <a:pt x="9101203" y="1295967"/>
+                  </a:lnTo>
+                  <a:lnTo>
+                    <a:pt x="0" y="1295967"/>
+                  </a:lnTo>
+                  <a:lnTo>
+                    <a:pt x="0" y="0"/>
+                  </a:lnTo>
+                  <a:close/>
+                </a:path>
+              </a:pathLst>
+            </a:custGeom>
+          </p:spPr>
+          <p:style>
+            <a:lnRef idx="0">
+              <a:schemeClr val="dk1">
+                <a:alpha val="0"/>
+                <a:hueOff val="0"/>
+                <a:satOff val="0"/>
+                <a:lumOff val="0"/>
+                <a:alphaOff val="0"/>
+              </a:schemeClr>
+            </a:lnRef>
+            <a:fillRef idx="0">
+              <a:schemeClr val="lt1">
+                <a:alpha val="0"/>
+                <a:hueOff val="0"/>
+                <a:satOff val="0"/>
+                <a:lumOff val="0"/>
+                <a:alphaOff val="0"/>
+              </a:schemeClr>
+            </a:fillRef>
+            <a:effectRef idx="0">
+              <a:schemeClr val="lt1">
+                <a:alpha val="0"/>
+                <a:hueOff val="0"/>
+                <a:satOff val="0"/>
+                <a:lumOff val="0"/>
+                <a:alphaOff val="0"/>
+              </a:schemeClr>
+            </a:effectRef>
+            <a:fontRef idx="minor">
+              <a:schemeClr val="tx1">
+                <a:hueOff val="0"/>
+                <a:satOff val="0"/>
+                <a:lumOff val="0"/>
+                <a:alphaOff val="0"/>
+              </a:schemeClr>
+            </a:fontRef>
+          </p:style>
+          <p:txBody>
+            <a:bodyPr spcFirstLastPara="0" vert="horz" wrap="square" lIns="137157" tIns="137157" rIns="137157" bIns="137157" numCol="1" spcCol="1270" anchor="ctr" anchorCtr="0">
+              <a:noAutofit/>
+            </a:bodyPr>
+            <a:lstStyle/>
+            <a:p>
+              <a:pPr marL="0" lvl="0" indent="0" algn="l" defTabSz="977900">
+                <a:lnSpc>
+                  <a:spcPct val="100000"/>
+                </a:lnSpc>
+                <a:spcBef>
+                  <a:spcPct val="0"/>
+                </a:spcBef>
+                <a:spcAft>
+                  <a:spcPct val="35000"/>
+                </a:spcAft>
+                <a:buNone/>
+              </a:pPr>
+              <a:r>
+                <a:rPr lang="pt-BR" sz="2200" kern="1200" dirty="0"/>
+                <a:t>Carnaval</a:t>
+              </a:r>
+            </a:p>
+          </p:txBody>
+        </p:sp>
+      </p:grpSp>
+      <p:grpSp>
+        <p:nvGrpSpPr>
+          <p:cNvPr id="25" name="Agrupar 24">
+            <a:extLst>
+              <a:ext uri="{FF2B5EF4-FFF2-40B4-BE49-F238E27FC236}">
+                <a16:creationId xmlns:a16="http://schemas.microsoft.com/office/drawing/2014/main" id="{4708EBB4-272B-0F99-3697-57DC808C0F6C}"/>
+              </a:ext>
+            </a:extLst>
+          </p:cNvPr>
+          <p:cNvGrpSpPr/>
+          <p:nvPr/>
+        </p:nvGrpSpPr>
+        <p:grpSpPr>
+          <a:xfrm>
+            <a:off x="419721" y="4977469"/>
+            <a:ext cx="10598047" cy="1312487"/>
+            <a:chOff x="419722" y="5019829"/>
+            <a:chExt cx="10598047" cy="1312487"/>
+          </a:xfrm>
+        </p:grpSpPr>
+        <p:sp>
+          <p:nvSpPr>
+            <p:cNvPr id="16" name="Retângulo: Cantos Arredondados 15">
+              <a:extLst>
+                <a:ext uri="{FF2B5EF4-FFF2-40B4-BE49-F238E27FC236}">
+                  <a16:creationId xmlns:a16="http://schemas.microsoft.com/office/drawing/2014/main" id="{EB6B4CD3-8DCF-E805-41E5-2B51348736FB}"/>
+                </a:ext>
+              </a:extLst>
+            </p:cNvPr>
+            <p:cNvSpPr/>
+            <p:nvPr/>
+          </p:nvSpPr>
+          <p:spPr>
+            <a:xfrm>
+              <a:off x="419722" y="5036349"/>
+              <a:ext cx="10598046" cy="1295967"/>
+            </a:xfrm>
+            <a:prstGeom prst="roundRect">
+              <a:avLst>
+                <a:gd name="adj" fmla="val 10000"/>
+              </a:avLst>
+            </a:prstGeom>
+          </p:spPr>
+          <p:style>
+            <a:lnRef idx="0">
+              <a:schemeClr val="dk1">
+                <a:hueOff val="0"/>
+                <a:satOff val="0"/>
+                <a:lumOff val="0"/>
+                <a:alphaOff val="0"/>
+              </a:schemeClr>
+            </a:lnRef>
+            <a:fillRef idx="1">
+              <a:schemeClr val="accent2">
+                <a:tint val="40000"/>
+                <a:hueOff val="0"/>
+                <a:satOff val="0"/>
+                <a:lumOff val="0"/>
+                <a:alphaOff val="0"/>
+              </a:schemeClr>
+            </a:fillRef>
+            <a:effectRef idx="0">
+              <a:schemeClr val="accent2">
+                <a:tint val="40000"/>
+                <a:hueOff val="0"/>
+                <a:satOff val="0"/>
+                <a:lumOff val="0"/>
+                <a:alphaOff val="0"/>
+              </a:schemeClr>
+            </a:effectRef>
+            <a:fontRef idx="minor">
+              <a:schemeClr val="dk1">
+                <a:hueOff val="0"/>
+                <a:satOff val="0"/>
+                <a:lumOff val="0"/>
+                <a:alphaOff val="0"/>
+              </a:schemeClr>
+            </a:fontRef>
+          </p:style>
+          <p:txBody>
+            <a:bodyPr/>
+            <a:lstStyle/>
+            <a:p>
+              <a:endParaRPr lang="pt-BR" dirty="0"/>
+            </a:p>
+          </p:txBody>
+        </p:sp>
+        <p:grpSp>
+          <p:nvGrpSpPr>
+            <p:cNvPr id="24" name="Agrupar 23">
+              <a:extLst>
+                <a:ext uri="{FF2B5EF4-FFF2-40B4-BE49-F238E27FC236}">
+                  <a16:creationId xmlns:a16="http://schemas.microsoft.com/office/drawing/2014/main" id="{766ABD4F-9B53-D60A-7662-CA2A8BD69832}"/>
+                </a:ext>
+              </a:extLst>
+            </p:cNvPr>
+            <p:cNvGrpSpPr/>
+            <p:nvPr/>
+          </p:nvGrpSpPr>
+          <p:grpSpPr>
+            <a:xfrm>
+              <a:off x="811754" y="5019829"/>
+              <a:ext cx="10206015" cy="1295967"/>
+              <a:chOff x="811754" y="5019829"/>
+              <a:chExt cx="10206015" cy="1295967"/>
+            </a:xfrm>
+          </p:grpSpPr>
+          <p:sp>
+            <p:nvSpPr>
+              <p:cNvPr id="17" name="Retângulo 16" descr="Agulha">
+                <a:extLst>
+                  <a:ext uri="{FF2B5EF4-FFF2-40B4-BE49-F238E27FC236}">
+                    <a16:creationId xmlns:a16="http://schemas.microsoft.com/office/drawing/2014/main" id="{68CDE725-934F-6957-6A31-93F8B4759A45}"/>
+                  </a:ext>
+                </a:extLst>
+              </p:cNvPr>
+              <p:cNvSpPr/>
+              <p:nvPr/>
+            </p:nvSpPr>
+            <p:spPr>
+              <a:xfrm>
+                <a:off x="811754" y="5311422"/>
+                <a:ext cx="712781" cy="712781"/>
+              </a:xfrm>
+              <a:prstGeom prst="rect">
+                <a:avLst/>
+              </a:prstGeom>
+              <a:blipFill>
+                <a:blip r:embed="rId8">
+                  <a:extLst>
+                    <a:ext uri="{28A0092B-C50C-407E-A947-70E740481C1C}">
+                      <a14:useLocalDpi xmlns:a14="http://schemas.microsoft.com/office/drawing/2010/main" val="0"/>
+                    </a:ext>
+                    <a:ext uri="{96DAC541-7B7A-43D3-8B79-37D633B846F1}">
+                      <asvg:svgBlip xmlns:asvg="http://schemas.microsoft.com/office/drawing/2016/SVG/main" r:embed="rId9"/>
+                    </a:ext>
+                  </a:extLst>
+                </a:blip>
+                <a:stretch>
+                  <a:fillRect/>
+                </a:stretch>
+              </a:blipFill>
+            </p:spPr>
+            <p:style>
+              <a:lnRef idx="3">
+                <a:schemeClr val="lt1">
+                  <a:hueOff val="0"/>
+                  <a:satOff val="0"/>
+                  <a:lumOff val="0"/>
+                  <a:alphaOff val="0"/>
+                </a:schemeClr>
+              </a:lnRef>
+              <a:fillRef idx="1">
+                <a:scrgbClr r="0" g="0" b="0"/>
+              </a:fillRef>
+              <a:effectRef idx="1">
+                <a:schemeClr val="accent2">
+                  <a:shade val="80000"/>
+                  <a:hueOff val="-455004"/>
+                  <a:satOff val="8510"/>
+                  <a:lumOff val="27121"/>
+                  <a:alphaOff val="0"/>
+                </a:schemeClr>
+              </a:effectRef>
+              <a:fontRef idx="minor">
+                <a:schemeClr val="lt1"/>
+              </a:fontRef>
+            </p:style>
+            <p:txBody>
+              <a:bodyPr/>
+              <a:lstStyle/>
+              <a:p>
+                <a:endParaRPr lang="pt-BR"/>
+              </a:p>
+            </p:txBody>
+          </p:sp>
+          <p:sp>
+            <p:nvSpPr>
+              <p:cNvPr id="18" name="Forma Livre: Forma 17">
+                <a:extLst>
+                  <a:ext uri="{FF2B5EF4-FFF2-40B4-BE49-F238E27FC236}">
+                    <a16:creationId xmlns:a16="http://schemas.microsoft.com/office/drawing/2014/main" id="{A5764D0C-831F-5260-52D2-82F655DAE4B2}"/>
+                  </a:ext>
+                </a:extLst>
+              </p:cNvPr>
+              <p:cNvSpPr/>
+              <p:nvPr/>
+            </p:nvSpPr>
+            <p:spPr>
+              <a:xfrm>
+                <a:off x="1916566" y="5019829"/>
+                <a:ext cx="9101203" cy="1295967"/>
+              </a:xfrm>
+              <a:custGeom>
+                <a:avLst/>
+                <a:gdLst>
+                  <a:gd name="connsiteX0" fmla="*/ 0 w 9101203"/>
+                  <a:gd name="connsiteY0" fmla="*/ 0 h 1295967"/>
+                  <a:gd name="connsiteX1" fmla="*/ 9101203 w 9101203"/>
+                  <a:gd name="connsiteY1" fmla="*/ 0 h 1295967"/>
+                  <a:gd name="connsiteX2" fmla="*/ 9101203 w 9101203"/>
+                  <a:gd name="connsiteY2" fmla="*/ 1295967 h 1295967"/>
+                  <a:gd name="connsiteX3" fmla="*/ 0 w 9101203"/>
+                  <a:gd name="connsiteY3" fmla="*/ 1295967 h 1295967"/>
+                  <a:gd name="connsiteX4" fmla="*/ 0 w 9101203"/>
+                  <a:gd name="connsiteY4" fmla="*/ 0 h 1295967"/>
+                </a:gdLst>
+                <a:ahLst/>
+                <a:cxnLst>
+                  <a:cxn ang="0">
+                    <a:pos x="connsiteX0" y="connsiteY0"/>
+                  </a:cxn>
+                  <a:cxn ang="0">
+                    <a:pos x="connsiteX1" y="connsiteY1"/>
+                  </a:cxn>
+                  <a:cxn ang="0">
+                    <a:pos x="connsiteX2" y="connsiteY2"/>
+                  </a:cxn>
+                  <a:cxn ang="0">
+                    <a:pos x="connsiteX3" y="connsiteY3"/>
+                  </a:cxn>
+                  <a:cxn ang="0">
+                    <a:pos x="connsiteX4" y="connsiteY4"/>
+                  </a:cxn>
+                </a:cxnLst>
+                <a:rect l="l" t="t" r="r" b="b"/>
+                <a:pathLst>
+                  <a:path w="9101203" h="1295967">
+                    <a:moveTo>
+                      <a:pt x="0" y="0"/>
+                    </a:moveTo>
+                    <a:lnTo>
+                      <a:pt x="9101203" y="0"/>
+                    </a:lnTo>
+                    <a:lnTo>
+                      <a:pt x="9101203" y="1295967"/>
+                    </a:lnTo>
+                    <a:lnTo>
+                      <a:pt x="0" y="1295967"/>
+                    </a:lnTo>
+                    <a:lnTo>
+                      <a:pt x="0" y="0"/>
+                    </a:lnTo>
+                    <a:close/>
+                  </a:path>
+                </a:pathLst>
+              </a:custGeom>
+            </p:spPr>
+            <p:style>
+              <a:lnRef idx="0">
+                <a:schemeClr val="dk1">
+                  <a:alpha val="0"/>
+                  <a:hueOff val="0"/>
+                  <a:satOff val="0"/>
+                  <a:lumOff val="0"/>
+                  <a:alphaOff val="0"/>
+                </a:schemeClr>
+              </a:lnRef>
+              <a:fillRef idx="0">
+                <a:schemeClr val="lt1">
+                  <a:alpha val="0"/>
+                  <a:hueOff val="0"/>
+                  <a:satOff val="0"/>
+                  <a:lumOff val="0"/>
+                  <a:alphaOff val="0"/>
+                </a:schemeClr>
+              </a:fillRef>
+              <a:effectRef idx="0">
+                <a:schemeClr val="lt1">
+                  <a:alpha val="0"/>
+                  <a:hueOff val="0"/>
+                  <a:satOff val="0"/>
+                  <a:lumOff val="0"/>
+                  <a:alphaOff val="0"/>
+                </a:schemeClr>
+              </a:effectRef>
+              <a:fontRef idx="minor">
+                <a:schemeClr val="tx1">
+                  <a:hueOff val="0"/>
+                  <a:satOff val="0"/>
+                  <a:lumOff val="0"/>
+                  <a:alphaOff val="0"/>
+                </a:schemeClr>
+              </a:fontRef>
+            </p:style>
+            <p:txBody>
+              <a:bodyPr spcFirstLastPara="0" vert="horz" wrap="square" lIns="137157" tIns="137157" rIns="137157" bIns="137157" numCol="1" spcCol="1270" anchor="ctr" anchorCtr="0">
+                <a:noAutofit/>
+              </a:bodyPr>
+              <a:lstStyle/>
+              <a:p>
+                <a:pPr marL="0" lvl="0" indent="0" algn="l" defTabSz="977900">
+                  <a:lnSpc>
+                    <a:spcPct val="100000"/>
+                  </a:lnSpc>
+                  <a:spcBef>
+                    <a:spcPct val="0"/>
+                  </a:spcBef>
+                  <a:spcAft>
+                    <a:spcPct val="35000"/>
+                  </a:spcAft>
+                  <a:buNone/>
+                </a:pPr>
+                <a:r>
+                  <a:rPr lang="pt-BR" sz="2200" kern="1200" dirty="0"/>
+                  <a:t>Vírus e bactérias</a:t>
+                </a:r>
+              </a:p>
+            </p:txBody>
+          </p:sp>
+        </p:grpSp>
+      </p:grpSp>
+    </p:spTree>
+    <p:extLst>
+      <p:ext uri="{BB962C8B-B14F-4D97-AF65-F5344CB8AC3E}">
+        <p14:creationId xmlns:p14="http://schemas.microsoft.com/office/powerpoint/2010/main" val="1317047475"/>
+      </p:ext>
+    </p:extLst>
+  </p:cSld>
+  <p:clrMapOvr>
+    <a:masterClrMapping/>
+  </p:clrMapOvr>
+  <p:transition spd="slow">
+    <p:wipe/>
+  </p:transition>
+  <p:timing>
+    <p:tnLst>
+      <p:par>
+        <p:cTn id="1" dur="indefinite" restart="never" nodeType="tmRoot">
+          <p:childTnLst>
+            <p:seq concurrent="1" nextAc="seek">
+              <p:cTn id="2" dur="indefinite" nodeType="mainSeq">
+                <p:childTnLst>
+                  <p:par>
+                    <p:cTn id="3" fill="hold">
+                      <p:stCondLst>
+                        <p:cond delay="indefinite"/>
+                      </p:stCondLst>
+                      <p:childTnLst>
+                        <p:par>
+                          <p:cTn id="4" fill="hold">
+                            <p:stCondLst>
+                              <p:cond delay="0"/>
+                            </p:stCondLst>
+                            <p:childTnLst>
+                              <p:par>
+                                <p:cTn id="5" presetID="42" presetClass="path" presetSubtype="0" accel="50000" decel="50000" fill="hold" nodeType="clickEffect">
+                                  <p:stCondLst>
+                                    <p:cond delay="0"/>
+                                  </p:stCondLst>
+                                  <p:childTnLst>
+                                    <p:animMotion origin="layout" path="M 0.9056 -0.01528 L -2.5E-6 4.44444E-6 " pathEditMode="relative" rAng="0" ptsTypes="AA">
+                                      <p:cBhvr>
+                                        <p:cTn id="6" dur="2000" fill="hold"/>
+                                        <p:tgtEl>
+                                          <p:spTgt spid="19"/>
+                                        </p:tgtEl>
+                                        <p:attrNameLst>
+                                          <p:attrName>ppt_x</p:attrName>
+                                          <p:attrName>ppt_y</p:attrName>
+                                        </p:attrNameLst>
+                                      </p:cBhvr>
+                                      <p:rCtr x="-45221" y="972"/>
+                                    </p:animMotion>
+                                  </p:childTnLst>
+                                </p:cTn>
+                              </p:par>
+                              <p:par>
+                                <p:cTn id="7" presetID="42" presetClass="path" presetSubtype="0" accel="50000" decel="50000" fill="hold" nodeType="withEffect">
+                                  <p:stCondLst>
+                                    <p:cond delay="0"/>
+                                  </p:stCondLst>
+                                  <p:childTnLst>
+                                    <p:animMotion origin="layout" path="M 1.0043 0.0118 L -4.58333E-6 -4.81481E-6 " pathEditMode="relative" rAng="0" ptsTypes="AA">
+                                      <p:cBhvr>
+                                        <p:cTn id="8" dur="2000" fill="hold"/>
+                                        <p:tgtEl>
+                                          <p:spTgt spid="22"/>
+                                        </p:tgtEl>
+                                        <p:attrNameLst>
+                                          <p:attrName>ppt_x</p:attrName>
+                                          <p:attrName>ppt_y</p:attrName>
+                                        </p:attrNameLst>
+                                      </p:cBhvr>
+                                      <p:rCtr x="-50091" y="-463"/>
+                                    </p:animMotion>
+                                  </p:childTnLst>
+                                </p:cTn>
+                              </p:par>
+                              <p:par>
+                                <p:cTn id="9" presetID="42" presetClass="path" presetSubtype="0" accel="50000" decel="50000" fill="hold" nodeType="withEffect">
+                                  <p:stCondLst>
+                                    <p:cond delay="0"/>
+                                  </p:stCondLst>
+                                  <p:childTnLst>
+                                    <p:animMotion origin="layout" path="M -0.71302 0.00139 L 1.45833E-6 -3.33333E-6 " pathEditMode="relative" rAng="0" ptsTypes="AA">
+                                      <p:cBhvr>
+                                        <p:cTn id="10" dur="2000" fill="hold"/>
+                                        <p:tgtEl>
+                                          <p:spTgt spid="25"/>
+                                        </p:tgtEl>
+                                        <p:attrNameLst>
+                                          <p:attrName>ppt_x</p:attrName>
+                                          <p:attrName>ppt_y</p:attrName>
+                                        </p:attrNameLst>
+                                      </p:cBhvr>
+                                      <p:rCtr x="35586" y="208"/>
+                                    </p:animMotion>
+                                  </p:childTnLst>
+                                </p:cTn>
+                              </p:par>
+                              <p:par>
+                                <p:cTn id="11" presetID="42" presetClass="path" presetSubtype="0" accel="50000" decel="50000" fill="hold" nodeType="withEffect">
+                                  <p:stCondLst>
+                                    <p:cond delay="0"/>
+                                  </p:stCondLst>
+                                  <p:childTnLst>
+                                    <p:animMotion origin="layout" path="M -0.85924 -0.00764 L 3.54167E-6 4.07407E-6 " pathEditMode="relative" rAng="0" ptsTypes="AA">
+                                      <p:cBhvr>
+                                        <p:cTn id="12" dur="2000" fill="hold"/>
+                                        <p:tgtEl>
+                                          <p:spTgt spid="26"/>
+                                        </p:tgtEl>
+                                        <p:attrNameLst>
+                                          <p:attrName>ppt_x</p:attrName>
+                                          <p:attrName>ppt_y</p:attrName>
+                                        </p:attrNameLst>
+                                      </p:cBhvr>
+                                      <p:rCtr x="42839" y="463"/>
+                                    </p:animMotion>
+                                  </p:childTnLst>
+                                </p:cTn>
+                              </p:par>
+                            </p:childTnLst>
+                          </p:cTn>
+                        </p:par>
+                      </p:childTnLst>
+                    </p:cTn>
+                  </p:par>
+                </p:childTnLst>
+              </p:cTn>
+              <p:prevCondLst>
+                <p:cond evt="onPrev" delay="0">
+                  <p:tgtEl>
+                    <p:sldTgt/>
+                  </p:tgtEl>
+                </p:cond>
+              </p:prevCondLst>
+              <p:nextCondLst>
+                <p:cond evt="onNext" delay="0">
+                  <p:tgtEl>
+                    <p:sldTgt/>
+                  </p:tgtEl>
+                </p:cond>
+              </p:nextCondLst>
+            </p:seq>
+          </p:childTnLst>
+        </p:cTn>
+      </p:par>
+    </p:tnLst>
+  </p:timing>
+</p:sld>
+</file>
+
+<file path=ppt/slides/slide7.xml><?xml version="1.0" encoding="utf-8"?>
 <p:sld xmlns:a="http://schemas.openxmlformats.org/drawingml/2006/main" xmlns:r="http://schemas.openxmlformats.org/officeDocument/2006/relationships" xmlns:p="http://schemas.openxmlformats.org/presentationml/2006/main">
   <p:cSld>
     <p:spTree>
@@ -5787,6 +8358,273 @@
   <p:clrMapOvr>
     <a:masterClrMapping/>
   </p:clrMapOvr>
+  <p:transition spd="slow">
+    <p:wipe/>
+  </p:transition>
+  <p:timing>
+    <p:tnLst>
+      <p:par>
+        <p:cTn id="1" dur="indefinite" restart="never" nodeType="tmRoot">
+          <p:childTnLst>
+            <p:seq concurrent="1" nextAc="seek">
+              <p:cTn id="2" dur="indefinite" nodeType="mainSeq">
+                <p:childTnLst>
+                  <p:par>
+                    <p:cTn id="3" fill="hold">
+                      <p:stCondLst>
+                        <p:cond delay="indefinite"/>
+                      </p:stCondLst>
+                      <p:childTnLst>
+                        <p:par>
+                          <p:cTn id="4" fill="hold">
+                            <p:stCondLst>
+                              <p:cond delay="0"/>
+                            </p:stCondLst>
+                            <p:childTnLst>
+                              <p:par>
+                                <p:cTn id="5" presetID="2" presetClass="entr" presetSubtype="4" fill="hold" grpId="0" nodeType="clickEffect">
+                                  <p:stCondLst>
+                                    <p:cond delay="0"/>
+                                  </p:stCondLst>
+                                  <p:childTnLst>
+                                    <p:set>
+                                      <p:cBhvr>
+                                        <p:cTn id="6" dur="1" fill="hold">
+                                          <p:stCondLst>
+                                            <p:cond delay="0"/>
+                                          </p:stCondLst>
+                                        </p:cTn>
+                                        <p:tgtEl>
+                                          <p:spTgt spid="5"/>
+                                        </p:tgtEl>
+                                        <p:attrNameLst>
+                                          <p:attrName>style.visibility</p:attrName>
+                                        </p:attrNameLst>
+                                      </p:cBhvr>
+                                      <p:to>
+                                        <p:strVal val="visible"/>
+                                      </p:to>
+                                    </p:set>
+                                    <p:anim calcmode="lin" valueType="num">
+                                      <p:cBhvr additive="base">
+                                        <p:cTn id="7" dur="500" fill="hold"/>
+                                        <p:tgtEl>
+                                          <p:spTgt spid="5"/>
+                                        </p:tgtEl>
+                                        <p:attrNameLst>
+                                          <p:attrName>ppt_x</p:attrName>
+                                        </p:attrNameLst>
+                                      </p:cBhvr>
+                                      <p:tavLst>
+                                        <p:tav tm="0">
+                                          <p:val>
+                                            <p:strVal val="#ppt_x"/>
+                                          </p:val>
+                                        </p:tav>
+                                        <p:tav tm="100000">
+                                          <p:val>
+                                            <p:strVal val="#ppt_x"/>
+                                          </p:val>
+                                        </p:tav>
+                                      </p:tavLst>
+                                    </p:anim>
+                                    <p:anim calcmode="lin" valueType="num">
+                                      <p:cBhvr additive="base">
+                                        <p:cTn id="8" dur="500" fill="hold"/>
+                                        <p:tgtEl>
+                                          <p:spTgt spid="5"/>
+                                        </p:tgtEl>
+                                        <p:attrNameLst>
+                                          <p:attrName>ppt_y</p:attrName>
+                                        </p:attrNameLst>
+                                      </p:cBhvr>
+                                      <p:tavLst>
+                                        <p:tav tm="0">
+                                          <p:val>
+                                            <p:strVal val="1+#ppt_h/2"/>
+                                          </p:val>
+                                        </p:tav>
+                                        <p:tav tm="100000">
+                                          <p:val>
+                                            <p:strVal val="#ppt_y"/>
+                                          </p:val>
+                                        </p:tav>
+                                      </p:tavLst>
+                                    </p:anim>
+                                  </p:childTnLst>
+                                </p:cTn>
+                              </p:par>
+                              <p:par>
+                                <p:cTn id="9" presetID="10" presetClass="entr" presetSubtype="0" fill="hold" nodeType="withEffect">
+                                  <p:stCondLst>
+                                    <p:cond delay="0"/>
+                                  </p:stCondLst>
+                                  <p:childTnLst>
+                                    <p:set>
+                                      <p:cBhvr>
+                                        <p:cTn id="10" dur="1" fill="hold">
+                                          <p:stCondLst>
+                                            <p:cond delay="0"/>
+                                          </p:stCondLst>
+                                        </p:cTn>
+                                        <p:tgtEl>
+                                          <p:spTgt spid="4"/>
+                                        </p:tgtEl>
+                                        <p:attrNameLst>
+                                          <p:attrName>style.visibility</p:attrName>
+                                        </p:attrNameLst>
+                                      </p:cBhvr>
+                                      <p:to>
+                                        <p:strVal val="visible"/>
+                                      </p:to>
+                                    </p:set>
+                                    <p:animEffect transition="in" filter="fade">
+                                      <p:cBhvr>
+                                        <p:cTn id="11" dur="500"/>
+                                        <p:tgtEl>
+                                          <p:spTgt spid="4"/>
+                                        </p:tgtEl>
+                                      </p:cBhvr>
+                                    </p:animEffect>
+                                  </p:childTnLst>
+                                </p:cTn>
+                              </p:par>
+                              <p:par>
+                                <p:cTn id="12" presetID="31" presetClass="entr" presetSubtype="0" fill="hold" grpId="0" nodeType="withEffect">
+                                  <p:stCondLst>
+                                    <p:cond delay="0"/>
+                                  </p:stCondLst>
+                                  <p:childTnLst>
+                                    <p:set>
+                                      <p:cBhvr>
+                                        <p:cTn id="13" dur="1" fill="hold">
+                                          <p:stCondLst>
+                                            <p:cond delay="0"/>
+                                          </p:stCondLst>
+                                        </p:cTn>
+                                        <p:tgtEl>
+                                          <p:spTgt spid="6"/>
+                                        </p:tgtEl>
+                                        <p:attrNameLst>
+                                          <p:attrName>style.visibility</p:attrName>
+                                        </p:attrNameLst>
+                                      </p:cBhvr>
+                                      <p:to>
+                                        <p:strVal val="visible"/>
+                                      </p:to>
+                                    </p:set>
+                                    <p:anim calcmode="lin" valueType="num">
+                                      <p:cBhvr>
+                                        <p:cTn id="14" dur="1000" fill="hold"/>
+                                        <p:tgtEl>
+                                          <p:spTgt spid="6"/>
+                                        </p:tgtEl>
+                                        <p:attrNameLst>
+                                          <p:attrName>ppt_w</p:attrName>
+                                        </p:attrNameLst>
+                                      </p:cBhvr>
+                                      <p:tavLst>
+                                        <p:tav tm="0">
+                                          <p:val>
+                                            <p:fltVal val="0"/>
+                                          </p:val>
+                                        </p:tav>
+                                        <p:tav tm="100000">
+                                          <p:val>
+                                            <p:strVal val="#ppt_w"/>
+                                          </p:val>
+                                        </p:tav>
+                                      </p:tavLst>
+                                    </p:anim>
+                                    <p:anim calcmode="lin" valueType="num">
+                                      <p:cBhvr>
+                                        <p:cTn id="15" dur="1000" fill="hold"/>
+                                        <p:tgtEl>
+                                          <p:spTgt spid="6"/>
+                                        </p:tgtEl>
+                                        <p:attrNameLst>
+                                          <p:attrName>ppt_h</p:attrName>
+                                        </p:attrNameLst>
+                                      </p:cBhvr>
+                                      <p:tavLst>
+                                        <p:tav tm="0">
+                                          <p:val>
+                                            <p:fltVal val="0"/>
+                                          </p:val>
+                                        </p:tav>
+                                        <p:tav tm="100000">
+                                          <p:val>
+                                            <p:strVal val="#ppt_h"/>
+                                          </p:val>
+                                        </p:tav>
+                                      </p:tavLst>
+                                    </p:anim>
+                                    <p:anim calcmode="lin" valueType="num">
+                                      <p:cBhvr>
+                                        <p:cTn id="16" dur="1000" fill="hold"/>
+                                        <p:tgtEl>
+                                          <p:spTgt spid="6"/>
+                                        </p:tgtEl>
+                                        <p:attrNameLst>
+                                          <p:attrName>style.rotation</p:attrName>
+                                        </p:attrNameLst>
+                                      </p:cBhvr>
+                                      <p:tavLst>
+                                        <p:tav tm="0">
+                                          <p:val>
+                                            <p:fltVal val="90"/>
+                                          </p:val>
+                                        </p:tav>
+                                        <p:tav tm="100000">
+                                          <p:val>
+                                            <p:fltVal val="0"/>
+                                          </p:val>
+                                        </p:tav>
+                                      </p:tavLst>
+                                    </p:anim>
+                                    <p:animEffect transition="in" filter="fade">
+                                      <p:cBhvr>
+                                        <p:cTn id="17" dur="1000"/>
+                                        <p:tgtEl>
+                                          <p:spTgt spid="6"/>
+                                        </p:tgtEl>
+                                      </p:cBhvr>
+                                    </p:animEffect>
+                                  </p:childTnLst>
+                                </p:cTn>
+                              </p:par>
+                            </p:childTnLst>
+                          </p:cTn>
+                        </p:par>
+                      </p:childTnLst>
+                    </p:cTn>
+                  </p:par>
+                </p:childTnLst>
+              </p:cTn>
+              <p:prevCondLst>
+                <p:cond evt="onPrev" delay="0">
+                  <p:tgtEl>
+                    <p:sldTgt/>
+                  </p:tgtEl>
+                </p:cond>
+              </p:prevCondLst>
+              <p:nextCondLst>
+                <p:cond evt="onNext" delay="0">
+                  <p:tgtEl>
+                    <p:sldTgt/>
+                  </p:tgtEl>
+                </p:cond>
+              </p:nextCondLst>
+            </p:seq>
+          </p:childTnLst>
+        </p:cTn>
+      </p:par>
+    </p:tnLst>
+    <p:bldLst>
+      <p:bldP spid="5" grpId="0" animBg="1"/>
+      <p:bldP spid="6" grpId="0"/>
+    </p:bldLst>
+  </p:timing>
 </p:sld>
 </file>
 

</xml_diff>